<commit_message>
Enhance presentation structure by adding gray section title cards with narrative subtitles for improved executive storytelling. Update related documentation and ensure consistent branding across slides.
</commit_message>
<xml_diff>
--- a/output/escalation_report_2025-12-22.pptx
+++ b/output/escalation_report_2025-12-22.pptx
@@ -5,30 +5,30 @@
     <p:sldMasterId id="2147483648" r:id="rId1"/>
   </p:sldMasterIdLst>
   <p:sldIdLst>
-    <p:sldId id="256" r:id="rId7"/>
-    <p:sldId id="257" r:id="rId8"/>
-    <p:sldId id="258" r:id="rId9"/>
-    <p:sldId id="259" r:id="rId10"/>
-    <p:sldId id="260" r:id="rId11"/>
-    <p:sldId id="261" r:id="rId12"/>
-    <p:sldId id="262" r:id="rId13"/>
-    <p:sldId id="263" r:id="rId14"/>
-    <p:sldId id="264" r:id="rId15"/>
-    <p:sldId id="265" r:id="rId16"/>
-    <p:sldId id="266" r:id="rId17"/>
-    <p:sldId id="267" r:id="rId18"/>
-    <p:sldId id="268" r:id="rId19"/>
-    <p:sldId id="269" r:id="rId20"/>
-    <p:sldId id="270" r:id="rId21"/>
-    <p:sldId id="271" r:id="rId22"/>
-    <p:sldId id="272" r:id="rId23"/>
-    <p:sldId id="273" r:id="rId24"/>
-    <p:sldId id="274" r:id="rId25"/>
-    <p:sldId id="275" r:id="rId26"/>
-    <p:sldId id="276" r:id="rId27"/>
-    <p:sldId id="277" r:id="rId28"/>
+    <p:sldId id="256" r:id="rId2"/>
+    <p:sldId id="257" r:id="rId3"/>
+    <p:sldId id="258" r:id="rId4"/>
+    <p:sldId id="259" r:id="rId5"/>
+    <p:sldId id="260" r:id="rId6"/>
+    <p:sldId id="261" r:id="rId7"/>
+    <p:sldId id="262" r:id="rId8"/>
+    <p:sldId id="263" r:id="rId9"/>
+    <p:sldId id="264" r:id="rId10"/>
+    <p:sldId id="265" r:id="rId11"/>
+    <p:sldId id="266" r:id="rId12"/>
+    <p:sldId id="267" r:id="rId13"/>
+    <p:sldId id="268" r:id="rId14"/>
+    <p:sldId id="269" r:id="rId15"/>
+    <p:sldId id="270" r:id="rId16"/>
+    <p:sldId id="271" r:id="rId17"/>
+    <p:sldId id="272" r:id="rId18"/>
+    <p:sldId id="273" r:id="rId19"/>
+    <p:sldId id="274" r:id="rId20"/>
+    <p:sldId id="275" r:id="rId21"/>
+    <p:sldId id="276" r:id="rId22"/>
+    <p:sldId id="277" r:id="rId23"/>
   </p:sldIdLst>
-  <p:sldSz cx="9144000" cy="5143500" type="screen4x3"/>
+  <p:sldSz cx="9144000" cy="5143500" type="screen16x9"/>
   <p:notesSz cx="6858000" cy="9144000"/>
   <p:defaultTextStyle>
     <a:defPPr>
@@ -125,6 +125,22 @@
       </a:defRPr>
     </a:lvl9pPr>
   </p:defaultTextStyle>
+  <p:extLst>
+    <p:ext uri="{EFAFB233-063F-42B5-8137-9DF3F51BA10A}">
+      <p15:sldGuideLst xmlns:p15="http://schemas.microsoft.com/office/powerpoint/2012/main">
+        <p15:guide id="1" orient="horz" pos="2160">
+          <p15:clr>
+            <a:srgbClr val="A4A3A4"/>
+          </p15:clr>
+        </p15:guide>
+        <p15:guide id="2" pos="2880">
+          <p15:clr>
+            <a:srgbClr val="A4A3A4"/>
+          </p15:clr>
+        </p15:guide>
+      </p15:sldGuideLst>
+    </p:ext>
+  </p:extLst>
 </p:presentation>
 </file>
 
@@ -166,10 +182,9 @@
           <a:lstStyle/>
           <a:p>
             <a:r>
-              <a:rPr lang="en-US" smtClean="0"/>
+              <a:rPr lang="en-US"/>
               <a:t>Click to edit Master title style</a:t>
             </a:r>
-            <a:endParaRPr lang="en-US"/>
           </a:p>
         </p:txBody>
       </p:sp>
@@ -285,10 +300,9 @@
           </a:lstStyle>
           <a:p>
             <a:r>
-              <a:rPr lang="en-US" smtClean="0"/>
+              <a:rPr lang="en-US"/>
               <a:t>Click to edit Master subtitle style</a:t>
             </a:r>
-            <a:endParaRPr lang="en-US"/>
           </a:p>
         </p:txBody>
       </p:sp>
@@ -309,7 +323,7 @@
           <a:p>
             <a:fld id="{5BCAD085-E8A6-8845-BD4E-CB4CCA059FC4}" type="datetimeFigureOut">
               <a:rPr lang="en-US" smtClean="0"/>
-              <a:t>1/27/13</a:t>
+              <a:t>12/22/25</a:t>
             </a:fld>
             <a:endParaRPr lang="en-US"/>
           </a:p>
@@ -403,10 +417,9 @@
           <a:lstStyle/>
           <a:p>
             <a:r>
-              <a:rPr lang="en-US" smtClean="0"/>
+              <a:rPr lang="en-US"/>
               <a:t>Click to edit Master title style</a:t>
             </a:r>
-            <a:endParaRPr lang="en-US"/>
           </a:p>
         </p:txBody>
       </p:sp>
@@ -427,38 +440,37 @@
           <a:p>
             <a:pPr lvl="0"/>
             <a:r>
-              <a:rPr lang="en-US" smtClean="0"/>
+              <a:rPr lang="en-US"/>
               <a:t>Click to edit Master text styles</a:t>
             </a:r>
           </a:p>
           <a:p>
             <a:pPr lvl="1"/>
             <a:r>
-              <a:rPr lang="en-US" smtClean="0"/>
+              <a:rPr lang="en-US"/>
               <a:t>Second level</a:t>
             </a:r>
           </a:p>
           <a:p>
             <a:pPr lvl="2"/>
             <a:r>
-              <a:rPr lang="en-US" smtClean="0"/>
+              <a:rPr lang="en-US"/>
               <a:t>Third level</a:t>
             </a:r>
           </a:p>
           <a:p>
             <a:pPr lvl="3"/>
             <a:r>
-              <a:rPr lang="en-US" smtClean="0"/>
+              <a:rPr lang="en-US"/>
               <a:t>Fourth level</a:t>
             </a:r>
           </a:p>
           <a:p>
             <a:pPr lvl="4"/>
             <a:r>
-              <a:rPr lang="en-US" smtClean="0"/>
+              <a:rPr lang="en-US"/>
               <a:t>Fifth level</a:t>
             </a:r>
-            <a:endParaRPr lang="en-US"/>
           </a:p>
         </p:txBody>
       </p:sp>
@@ -479,7 +491,7 @@
           <a:p>
             <a:fld id="{5BCAD085-E8A6-8845-BD4E-CB4CCA059FC4}" type="datetimeFigureOut">
               <a:rPr lang="en-US" smtClean="0"/>
-              <a:t>1/27/13</a:t>
+              <a:t>12/22/25</a:t>
             </a:fld>
             <a:endParaRPr lang="en-US"/>
           </a:p>
@@ -578,10 +590,9 @@
           <a:lstStyle/>
           <a:p>
             <a:r>
-              <a:rPr lang="en-US" smtClean="0"/>
+              <a:rPr lang="en-US"/>
               <a:t>Click to edit Master title style</a:t>
             </a:r>
-            <a:endParaRPr lang="en-US"/>
           </a:p>
         </p:txBody>
       </p:sp>
@@ -607,38 +618,37 @@
           <a:p>
             <a:pPr lvl="0"/>
             <a:r>
-              <a:rPr lang="en-US" smtClean="0"/>
+              <a:rPr lang="en-US"/>
               <a:t>Click to edit Master text styles</a:t>
             </a:r>
           </a:p>
           <a:p>
             <a:pPr lvl="1"/>
             <a:r>
-              <a:rPr lang="en-US" smtClean="0"/>
+              <a:rPr lang="en-US"/>
               <a:t>Second level</a:t>
             </a:r>
           </a:p>
           <a:p>
             <a:pPr lvl="2"/>
             <a:r>
-              <a:rPr lang="en-US" smtClean="0"/>
+              <a:rPr lang="en-US"/>
               <a:t>Third level</a:t>
             </a:r>
           </a:p>
           <a:p>
             <a:pPr lvl="3"/>
             <a:r>
-              <a:rPr lang="en-US" smtClean="0"/>
+              <a:rPr lang="en-US"/>
               <a:t>Fourth level</a:t>
             </a:r>
           </a:p>
           <a:p>
             <a:pPr lvl="4"/>
             <a:r>
-              <a:rPr lang="en-US" smtClean="0"/>
+              <a:rPr lang="en-US"/>
               <a:t>Fifth level</a:t>
             </a:r>
-            <a:endParaRPr lang="en-US"/>
           </a:p>
         </p:txBody>
       </p:sp>
@@ -659,7 +669,7 @@
           <a:p>
             <a:fld id="{5BCAD085-E8A6-8845-BD4E-CB4CCA059FC4}" type="datetimeFigureOut">
               <a:rPr lang="en-US" smtClean="0"/>
-              <a:t>1/27/13</a:t>
+              <a:t>12/22/25</a:t>
             </a:fld>
             <a:endParaRPr lang="en-US"/>
           </a:p>
@@ -753,10 +763,9 @@
           <a:lstStyle/>
           <a:p>
             <a:r>
-              <a:rPr lang="en-US" smtClean="0"/>
+              <a:rPr lang="en-US"/>
               <a:t>Click to edit Master title style</a:t>
             </a:r>
-            <a:endParaRPr lang="en-US"/>
           </a:p>
         </p:txBody>
       </p:sp>
@@ -777,38 +786,37 @@
           <a:p>
             <a:pPr lvl="0"/>
             <a:r>
-              <a:rPr lang="en-US" smtClean="0"/>
+              <a:rPr lang="en-US"/>
               <a:t>Click to edit Master text styles</a:t>
             </a:r>
           </a:p>
           <a:p>
             <a:pPr lvl="1"/>
             <a:r>
-              <a:rPr lang="en-US" smtClean="0"/>
+              <a:rPr lang="en-US"/>
               <a:t>Second level</a:t>
             </a:r>
           </a:p>
           <a:p>
             <a:pPr lvl="2"/>
             <a:r>
-              <a:rPr lang="en-US" smtClean="0"/>
+              <a:rPr lang="en-US"/>
               <a:t>Third level</a:t>
             </a:r>
           </a:p>
           <a:p>
             <a:pPr lvl="3"/>
             <a:r>
-              <a:rPr lang="en-US" smtClean="0"/>
+              <a:rPr lang="en-US"/>
               <a:t>Fourth level</a:t>
             </a:r>
           </a:p>
           <a:p>
             <a:pPr lvl="4"/>
             <a:r>
-              <a:rPr lang="en-US" smtClean="0"/>
+              <a:rPr lang="en-US"/>
               <a:t>Fifth level</a:t>
             </a:r>
-            <a:endParaRPr lang="en-US"/>
           </a:p>
         </p:txBody>
       </p:sp>
@@ -829,7 +837,7 @@
           <a:p>
             <a:fld id="{5BCAD085-E8A6-8845-BD4E-CB4CCA059FC4}" type="datetimeFigureOut">
               <a:rPr lang="en-US" smtClean="0"/>
-              <a:t>1/27/13</a:t>
+              <a:t>12/22/25</a:t>
             </a:fld>
             <a:endParaRPr lang="en-US"/>
           </a:p>
@@ -932,10 +940,9 @@
           </a:lstStyle>
           <a:p>
             <a:r>
-              <a:rPr lang="en-US" smtClean="0"/>
+              <a:rPr lang="en-US"/>
               <a:t>Click to edit Master title style</a:t>
             </a:r>
-            <a:endParaRPr lang="en-US"/>
           </a:p>
         </p:txBody>
       </p:sp>
@@ -1052,7 +1059,7 @@
           <a:p>
             <a:pPr lvl="0"/>
             <a:r>
-              <a:rPr lang="en-US" smtClean="0"/>
+              <a:rPr lang="en-US"/>
               <a:t>Click to edit Master text styles</a:t>
             </a:r>
           </a:p>
@@ -1075,7 +1082,7 @@
           <a:p>
             <a:fld id="{5BCAD085-E8A6-8845-BD4E-CB4CCA059FC4}" type="datetimeFigureOut">
               <a:rPr lang="en-US" smtClean="0"/>
-              <a:t>1/27/13</a:t>
+              <a:t>12/22/25</a:t>
             </a:fld>
             <a:endParaRPr lang="en-US"/>
           </a:p>
@@ -1169,10 +1176,9 @@
           <a:lstStyle/>
           <a:p>
             <a:r>
-              <a:rPr lang="en-US" smtClean="0"/>
+              <a:rPr lang="en-US"/>
               <a:t>Click to edit Master title style</a:t>
             </a:r>
-            <a:endParaRPr lang="en-US"/>
           </a:p>
         </p:txBody>
       </p:sp>
@@ -1226,38 +1232,37 @@
           <a:p>
             <a:pPr lvl="0"/>
             <a:r>
-              <a:rPr lang="en-US" smtClean="0"/>
+              <a:rPr lang="en-US"/>
               <a:t>Click to edit Master text styles</a:t>
             </a:r>
           </a:p>
           <a:p>
             <a:pPr lvl="1"/>
             <a:r>
-              <a:rPr lang="en-US" smtClean="0"/>
+              <a:rPr lang="en-US"/>
               <a:t>Second level</a:t>
             </a:r>
           </a:p>
           <a:p>
             <a:pPr lvl="2"/>
             <a:r>
-              <a:rPr lang="en-US" smtClean="0"/>
+              <a:rPr lang="en-US"/>
               <a:t>Third level</a:t>
             </a:r>
           </a:p>
           <a:p>
             <a:pPr lvl="3"/>
             <a:r>
-              <a:rPr lang="en-US" smtClean="0"/>
+              <a:rPr lang="en-US"/>
               <a:t>Fourth level</a:t>
             </a:r>
           </a:p>
           <a:p>
             <a:pPr lvl="4"/>
             <a:r>
-              <a:rPr lang="en-US" smtClean="0"/>
+              <a:rPr lang="en-US"/>
               <a:t>Fifth level</a:t>
             </a:r>
-            <a:endParaRPr lang="en-US"/>
           </a:p>
         </p:txBody>
       </p:sp>
@@ -1311,38 +1316,37 @@
           <a:p>
             <a:pPr lvl="0"/>
             <a:r>
-              <a:rPr lang="en-US" smtClean="0"/>
+              <a:rPr lang="en-US"/>
               <a:t>Click to edit Master text styles</a:t>
             </a:r>
           </a:p>
           <a:p>
             <a:pPr lvl="1"/>
             <a:r>
-              <a:rPr lang="en-US" smtClean="0"/>
+              <a:rPr lang="en-US"/>
               <a:t>Second level</a:t>
             </a:r>
           </a:p>
           <a:p>
             <a:pPr lvl="2"/>
             <a:r>
-              <a:rPr lang="en-US" smtClean="0"/>
+              <a:rPr lang="en-US"/>
               <a:t>Third level</a:t>
             </a:r>
           </a:p>
           <a:p>
             <a:pPr lvl="3"/>
             <a:r>
-              <a:rPr lang="en-US" smtClean="0"/>
+              <a:rPr lang="en-US"/>
               <a:t>Fourth level</a:t>
             </a:r>
           </a:p>
           <a:p>
             <a:pPr lvl="4"/>
             <a:r>
-              <a:rPr lang="en-US" smtClean="0"/>
+              <a:rPr lang="en-US"/>
               <a:t>Fifth level</a:t>
             </a:r>
-            <a:endParaRPr lang="en-US"/>
           </a:p>
         </p:txBody>
       </p:sp>
@@ -1363,7 +1367,7 @@
           <a:p>
             <a:fld id="{5BCAD085-E8A6-8845-BD4E-CB4CCA059FC4}" type="datetimeFigureOut">
               <a:rPr lang="en-US" smtClean="0"/>
-              <a:t>1/27/13</a:t>
+              <a:t>12/22/25</a:t>
             </a:fld>
             <a:endParaRPr lang="en-US"/>
           </a:p>
@@ -1461,10 +1465,9 @@
           </a:lstStyle>
           <a:p>
             <a:r>
-              <a:rPr lang="en-US" smtClean="0"/>
+              <a:rPr lang="en-US"/>
               <a:t>Click to edit Master title style</a:t>
             </a:r>
-            <a:endParaRPr lang="en-US"/>
           </a:p>
         </p:txBody>
       </p:sp>
@@ -1527,7 +1530,7 @@
           <a:p>
             <a:pPr lvl="0"/>
             <a:r>
-              <a:rPr lang="en-US" smtClean="0"/>
+              <a:rPr lang="en-US"/>
               <a:t>Click to edit Master text styles</a:t>
             </a:r>
           </a:p>
@@ -1583,38 +1586,37 @@
           <a:p>
             <a:pPr lvl="0"/>
             <a:r>
-              <a:rPr lang="en-US" smtClean="0"/>
+              <a:rPr lang="en-US"/>
               <a:t>Click to edit Master text styles</a:t>
             </a:r>
           </a:p>
           <a:p>
             <a:pPr lvl="1"/>
             <a:r>
-              <a:rPr lang="en-US" smtClean="0"/>
+              <a:rPr lang="en-US"/>
               <a:t>Second level</a:t>
             </a:r>
           </a:p>
           <a:p>
             <a:pPr lvl="2"/>
             <a:r>
-              <a:rPr lang="en-US" smtClean="0"/>
+              <a:rPr lang="en-US"/>
               <a:t>Third level</a:t>
             </a:r>
           </a:p>
           <a:p>
             <a:pPr lvl="3"/>
             <a:r>
-              <a:rPr lang="en-US" smtClean="0"/>
+              <a:rPr lang="en-US"/>
               <a:t>Fourth level</a:t>
             </a:r>
           </a:p>
           <a:p>
             <a:pPr lvl="4"/>
             <a:r>
-              <a:rPr lang="en-US" smtClean="0"/>
+              <a:rPr lang="en-US"/>
               <a:t>Fifth level</a:t>
             </a:r>
-            <a:endParaRPr lang="en-US"/>
           </a:p>
         </p:txBody>
       </p:sp>
@@ -1677,7 +1679,7 @@
           <a:p>
             <a:pPr lvl="0"/>
             <a:r>
-              <a:rPr lang="en-US" smtClean="0"/>
+              <a:rPr lang="en-US"/>
               <a:t>Click to edit Master text styles</a:t>
             </a:r>
           </a:p>
@@ -1733,38 +1735,37 @@
           <a:p>
             <a:pPr lvl="0"/>
             <a:r>
-              <a:rPr lang="en-US" smtClean="0"/>
+              <a:rPr lang="en-US"/>
               <a:t>Click to edit Master text styles</a:t>
             </a:r>
           </a:p>
           <a:p>
             <a:pPr lvl="1"/>
             <a:r>
-              <a:rPr lang="en-US" smtClean="0"/>
+              <a:rPr lang="en-US"/>
               <a:t>Second level</a:t>
             </a:r>
           </a:p>
           <a:p>
             <a:pPr lvl="2"/>
             <a:r>
-              <a:rPr lang="en-US" smtClean="0"/>
+              <a:rPr lang="en-US"/>
               <a:t>Third level</a:t>
             </a:r>
           </a:p>
           <a:p>
             <a:pPr lvl="3"/>
             <a:r>
-              <a:rPr lang="en-US" smtClean="0"/>
+              <a:rPr lang="en-US"/>
               <a:t>Fourth level</a:t>
             </a:r>
           </a:p>
           <a:p>
             <a:pPr lvl="4"/>
             <a:r>
-              <a:rPr lang="en-US" smtClean="0"/>
+              <a:rPr lang="en-US"/>
               <a:t>Fifth level</a:t>
             </a:r>
-            <a:endParaRPr lang="en-US"/>
           </a:p>
         </p:txBody>
       </p:sp>
@@ -1785,7 +1786,7 @@
           <a:p>
             <a:fld id="{5BCAD085-E8A6-8845-BD4E-CB4CCA059FC4}" type="datetimeFigureOut">
               <a:rPr lang="en-US" smtClean="0"/>
-              <a:t>1/27/13</a:t>
+              <a:t>12/22/25</a:t>
             </a:fld>
             <a:endParaRPr lang="en-US"/>
           </a:p>
@@ -1879,10 +1880,9 @@
           <a:lstStyle/>
           <a:p>
             <a:r>
-              <a:rPr lang="en-US" smtClean="0"/>
+              <a:rPr lang="en-US"/>
               <a:t>Click to edit Master title style</a:t>
             </a:r>
-            <a:endParaRPr lang="en-US"/>
           </a:p>
         </p:txBody>
       </p:sp>
@@ -1903,7 +1903,7 @@
           <a:p>
             <a:fld id="{5BCAD085-E8A6-8845-BD4E-CB4CCA059FC4}" type="datetimeFigureOut">
               <a:rPr lang="en-US" smtClean="0"/>
-              <a:t>1/27/13</a:t>
+              <a:t>12/22/25</a:t>
             </a:fld>
             <a:endParaRPr lang="en-US"/>
           </a:p>
@@ -1998,7 +1998,7 @@
           <a:p>
             <a:fld id="{5BCAD085-E8A6-8845-BD4E-CB4CCA059FC4}" type="datetimeFigureOut">
               <a:rPr lang="en-US" smtClean="0"/>
-              <a:t>1/27/13</a:t>
+              <a:t>12/22/25</a:t>
             </a:fld>
             <a:endParaRPr lang="en-US"/>
           </a:p>
@@ -2101,10 +2101,9 @@
           </a:lstStyle>
           <a:p>
             <a:r>
-              <a:rPr lang="en-US" smtClean="0"/>
+              <a:rPr lang="en-US"/>
               <a:t>Click to edit Master title style</a:t>
             </a:r>
-            <a:endParaRPr lang="en-US"/>
           </a:p>
         </p:txBody>
       </p:sp>
@@ -2158,38 +2157,37 @@
           <a:p>
             <a:pPr lvl="0"/>
             <a:r>
-              <a:rPr lang="en-US" smtClean="0"/>
+              <a:rPr lang="en-US"/>
               <a:t>Click to edit Master text styles</a:t>
             </a:r>
           </a:p>
           <a:p>
             <a:pPr lvl="1"/>
             <a:r>
-              <a:rPr lang="en-US" smtClean="0"/>
+              <a:rPr lang="en-US"/>
               <a:t>Second level</a:t>
             </a:r>
           </a:p>
           <a:p>
             <a:pPr lvl="2"/>
             <a:r>
-              <a:rPr lang="en-US" smtClean="0"/>
+              <a:rPr lang="en-US"/>
               <a:t>Third level</a:t>
             </a:r>
           </a:p>
           <a:p>
             <a:pPr lvl="3"/>
             <a:r>
-              <a:rPr lang="en-US" smtClean="0"/>
+              <a:rPr lang="en-US"/>
               <a:t>Fourth level</a:t>
             </a:r>
           </a:p>
           <a:p>
             <a:pPr lvl="4"/>
             <a:r>
-              <a:rPr lang="en-US" smtClean="0"/>
+              <a:rPr lang="en-US"/>
               <a:t>Fifth level</a:t>
             </a:r>
-            <a:endParaRPr lang="en-US"/>
           </a:p>
         </p:txBody>
       </p:sp>
@@ -2252,7 +2250,7 @@
           <a:p>
             <a:pPr lvl="0"/>
             <a:r>
-              <a:rPr lang="en-US" smtClean="0"/>
+              <a:rPr lang="en-US"/>
               <a:t>Click to edit Master text styles</a:t>
             </a:r>
           </a:p>
@@ -2275,7 +2273,7 @@
           <a:p>
             <a:fld id="{5BCAD085-E8A6-8845-BD4E-CB4CCA059FC4}" type="datetimeFigureOut">
               <a:rPr lang="en-US" smtClean="0"/>
-              <a:t>1/27/13</a:t>
+              <a:t>12/22/25</a:t>
             </a:fld>
             <a:endParaRPr lang="en-US"/>
           </a:p>
@@ -2378,10 +2376,9 @@
           </a:lstStyle>
           <a:p>
             <a:r>
-              <a:rPr lang="en-US" smtClean="0"/>
+              <a:rPr lang="en-US"/>
               <a:t>Click to edit Master title style</a:t>
             </a:r>
-            <a:endParaRPr lang="en-US"/>
           </a:p>
         </p:txBody>
       </p:sp>
@@ -2505,7 +2502,7 @@
           <a:p>
             <a:pPr lvl="0"/>
             <a:r>
-              <a:rPr lang="en-US" smtClean="0"/>
+              <a:rPr lang="en-US"/>
               <a:t>Click to edit Master text styles</a:t>
             </a:r>
           </a:p>
@@ -2528,7 +2525,7 @@
           <a:p>
             <a:fld id="{5BCAD085-E8A6-8845-BD4E-CB4CCA059FC4}" type="datetimeFigureOut">
               <a:rPr lang="en-US" smtClean="0"/>
-              <a:t>1/27/13</a:t>
+              <a:t>12/22/25</a:t>
             </a:fld>
             <a:endParaRPr lang="en-US"/>
           </a:p>
@@ -2640,10 +2637,9 @@
           <a:lstStyle/>
           <a:p>
             <a:r>
-              <a:rPr lang="en-US" smtClean="0"/>
+              <a:rPr lang="en-US"/>
               <a:t>Click to edit Master title style</a:t>
             </a:r>
-            <a:endParaRPr lang="en-US"/>
           </a:p>
         </p:txBody>
       </p:sp>
@@ -2674,38 +2670,37 @@
           <a:p>
             <a:pPr lvl="0"/>
             <a:r>
-              <a:rPr lang="en-US" smtClean="0"/>
+              <a:rPr lang="en-US"/>
               <a:t>Click to edit Master text styles</a:t>
             </a:r>
           </a:p>
           <a:p>
             <a:pPr lvl="1"/>
             <a:r>
-              <a:rPr lang="en-US" smtClean="0"/>
+              <a:rPr lang="en-US"/>
               <a:t>Second level</a:t>
             </a:r>
           </a:p>
           <a:p>
             <a:pPr lvl="2"/>
             <a:r>
-              <a:rPr lang="en-US" smtClean="0"/>
+              <a:rPr lang="en-US"/>
               <a:t>Third level</a:t>
             </a:r>
           </a:p>
           <a:p>
             <a:pPr lvl="3"/>
             <a:r>
-              <a:rPr lang="en-US" smtClean="0"/>
+              <a:rPr lang="en-US"/>
               <a:t>Fourth level</a:t>
             </a:r>
           </a:p>
           <a:p>
             <a:pPr lvl="4"/>
             <a:r>
-              <a:rPr lang="en-US" smtClean="0"/>
+              <a:rPr lang="en-US"/>
               <a:t>Fifth level</a:t>
             </a:r>
-            <a:endParaRPr lang="en-US"/>
           </a:p>
         </p:txBody>
       </p:sp>
@@ -2744,7 +2739,7 @@
           <a:p>
             <a:fld id="{5BCAD085-E8A6-8845-BD4E-CB4CCA059FC4}" type="datetimeFigureOut">
               <a:rPr lang="en-US" smtClean="0"/>
-              <a:t>1/27/13</a:t>
+              <a:t>12/22/25</a:t>
             </a:fld>
             <a:endParaRPr lang="en-US"/>
           </a:p>
@@ -3103,402 +3098,44 @@
 </file>
 
 <file path=ppt/slides/slide1.xml><?xml version="1.0" encoding="utf-8"?>
-<p:sld xmlns:a="http://schemas.openxmlformats.org/drawingml/2006/main" xmlns:p="http://schemas.openxmlformats.org/presentationml/2006/main" xmlns:r="http://schemas.openxmlformats.org/officeDocument/2006/relationships">
+<p:sld xmlns:a="http://schemas.openxmlformats.org/drawingml/2006/main" xmlns:r="http://schemas.openxmlformats.org/officeDocument/2006/relationships" xmlns:p="http://schemas.openxmlformats.org/presentationml/2006/main">
   <p:cSld>
+    <p:bg>
+      <p:bgPr>
+        <a:gradFill flip="none" rotWithShape="1">
+          <a:gsLst>
+            <a:gs pos="0">
+              <a:srgbClr val="0094D4"/>
+            </a:gs>
+            <a:gs pos="61000">
+              <a:srgbClr val="017BBA"/>
+            </a:gs>
+            <a:gs pos="100000">
+              <a:srgbClr val="005F9E"/>
+            </a:gs>
+          </a:gsLst>
+          <a:path path="circle">
+            <a:fillToRect t="100000" r="100000"/>
+          </a:path>
+          <a:tileRect l="-100000" b="-100000"/>
+        </a:gradFill>
+        <a:effectLst/>
+      </p:bgPr>
+    </p:bg>
     <p:spTree>
       <p:nvGrpSpPr>
         <p:cNvPr id="1" name=""/>
         <p:cNvGrpSpPr/>
         <p:nvPr/>
       </p:nvGrpSpPr>
-      <p:grpSpPr/>
-      <p:sp>
-        <p:nvSpPr>
-          <p:cNvPr id="2" name="Rectangle 1"/>
-          <p:cNvSpPr/>
-          <p:nvPr/>
-        </p:nvSpPr>
-        <p:spPr>
-          <a:xfrm>
-            <a:off x="0" y="0"/>
-            <a:ext cx="9144000" cy="5143500"/>
-          </a:xfrm>
-          <a:prstGeom prst="rect">
-            <a:avLst/>
-          </a:prstGeom>
-          <a:solidFill>
-            <a:srgbClr val="004C97"/>
-          </a:solidFill>
-          <a:ln>
-            <a:noFill/>
-          </a:ln>
-        </p:spPr>
-        <p:style>
-          <a:lnRef idx="1">
-            <a:schemeClr val="accent1"/>
-          </a:lnRef>
-          <a:fillRef idx="3">
-            <a:schemeClr val="accent1"/>
-          </a:fillRef>
-          <a:effectRef idx="2">
-            <a:schemeClr val="accent1"/>
-          </a:effectRef>
-          <a:fontRef idx="minor">
-            <a:schemeClr val="lt1"/>
-          </a:fontRef>
-        </p:style>
-        <p:txBody>
-          <a:bodyPr rtlCol="0" anchor="ctr"/>
-          <a:lstStyle/>
-          <a:p>
-            <a:pPr algn="ctr"/>
-          </a:p>
-        </p:txBody>
-      </p:sp>
-      <p:sp>
-        <p:nvSpPr>
-          <p:cNvPr id="3" name="Rectangle 2"/>
-          <p:cNvSpPr/>
-          <p:nvPr/>
-        </p:nvSpPr>
-        <p:spPr>
-          <a:xfrm>
-            <a:off x="0" y="0"/>
-            <a:ext cx="1152144" cy="5143500"/>
-          </a:xfrm>
-          <a:prstGeom prst="rect">
-            <a:avLst/>
-          </a:prstGeom>
-          <a:solidFill>
-            <a:srgbClr val="009CDE"/>
-          </a:solidFill>
-          <a:ln>
-            <a:noFill/>
-          </a:ln>
-        </p:spPr>
-        <p:style>
-          <a:lnRef idx="1">
-            <a:schemeClr val="accent1"/>
-          </a:lnRef>
-          <a:fillRef idx="3">
-            <a:schemeClr val="accent1"/>
-          </a:fillRef>
-          <a:effectRef idx="2">
-            <a:schemeClr val="accent1"/>
-          </a:effectRef>
-          <a:fontRef idx="minor">
-            <a:schemeClr val="lt1"/>
-          </a:fontRef>
-        </p:style>
-        <p:txBody>
-          <a:bodyPr rtlCol="0" anchor="ctr"/>
-          <a:lstStyle/>
-          <a:p>
-            <a:pPr algn="ctr"/>
-          </a:p>
-        </p:txBody>
-      </p:sp>
-      <p:sp>
-        <p:nvSpPr>
-          <p:cNvPr id="4" name="Rectangle 3"/>
-          <p:cNvSpPr/>
-          <p:nvPr/>
-        </p:nvSpPr>
-        <p:spPr>
-          <a:xfrm>
-            <a:off x="1143000" y="0"/>
-            <a:ext cx="1152144" cy="5143500"/>
-          </a:xfrm>
-          <a:prstGeom prst="rect">
-            <a:avLst/>
-          </a:prstGeom>
-          <a:solidFill>
-            <a:srgbClr val="0090D3"/>
-          </a:solidFill>
-          <a:ln>
-            <a:noFill/>
-          </a:ln>
-        </p:spPr>
-        <p:style>
-          <a:lnRef idx="1">
-            <a:schemeClr val="accent1"/>
-          </a:lnRef>
-          <a:fillRef idx="3">
-            <a:schemeClr val="accent1"/>
-          </a:fillRef>
-          <a:effectRef idx="2">
-            <a:schemeClr val="accent1"/>
-          </a:effectRef>
-          <a:fontRef idx="minor">
-            <a:schemeClr val="lt1"/>
-          </a:fontRef>
-        </p:style>
-        <p:txBody>
-          <a:bodyPr rtlCol="0" anchor="ctr"/>
-          <a:lstStyle/>
-          <a:p>
-            <a:pPr algn="ctr"/>
-          </a:p>
-        </p:txBody>
-      </p:sp>
-      <p:sp>
-        <p:nvSpPr>
-          <p:cNvPr id="5" name="Rectangle 4"/>
-          <p:cNvSpPr/>
-          <p:nvPr/>
-        </p:nvSpPr>
-        <p:spPr>
-          <a:xfrm>
-            <a:off x="2286000" y="0"/>
-            <a:ext cx="1152144" cy="5143500"/>
-          </a:xfrm>
-          <a:prstGeom prst="rect">
-            <a:avLst/>
-          </a:prstGeom>
-          <a:solidFill>
-            <a:srgbClr val="0085C9"/>
-          </a:solidFill>
-          <a:ln>
-            <a:noFill/>
-          </a:ln>
-        </p:spPr>
-        <p:style>
-          <a:lnRef idx="1">
-            <a:schemeClr val="accent1"/>
-          </a:lnRef>
-          <a:fillRef idx="3">
-            <a:schemeClr val="accent1"/>
-          </a:fillRef>
-          <a:effectRef idx="2">
-            <a:schemeClr val="accent1"/>
-          </a:effectRef>
-          <a:fontRef idx="minor">
-            <a:schemeClr val="lt1"/>
-          </a:fontRef>
-        </p:style>
-        <p:txBody>
-          <a:bodyPr rtlCol="0" anchor="ctr"/>
-          <a:lstStyle/>
-          <a:p>
-            <a:pPr algn="ctr"/>
-          </a:p>
-        </p:txBody>
-      </p:sp>
-      <p:sp>
-        <p:nvSpPr>
-          <p:cNvPr id="6" name="Rectangle 5"/>
-          <p:cNvSpPr/>
-          <p:nvPr/>
-        </p:nvSpPr>
-        <p:spPr>
-          <a:xfrm>
-            <a:off x="3429000" y="0"/>
-            <a:ext cx="1152144" cy="5143500"/>
-          </a:xfrm>
-          <a:prstGeom prst="rect">
-            <a:avLst/>
-          </a:prstGeom>
-          <a:solidFill>
-            <a:srgbClr val="0079BF"/>
-          </a:solidFill>
-          <a:ln>
-            <a:noFill/>
-          </a:ln>
-        </p:spPr>
-        <p:style>
-          <a:lnRef idx="1">
-            <a:schemeClr val="accent1"/>
-          </a:lnRef>
-          <a:fillRef idx="3">
-            <a:schemeClr val="accent1"/>
-          </a:fillRef>
-          <a:effectRef idx="2">
-            <a:schemeClr val="accent1"/>
-          </a:effectRef>
-          <a:fontRef idx="minor">
-            <a:schemeClr val="lt1"/>
-          </a:fontRef>
-        </p:style>
-        <p:txBody>
-          <a:bodyPr rtlCol="0" anchor="ctr"/>
-          <a:lstStyle/>
-          <a:p>
-            <a:pPr algn="ctr"/>
-          </a:p>
-        </p:txBody>
-      </p:sp>
-      <p:sp>
-        <p:nvSpPr>
-          <p:cNvPr id="7" name="Rectangle 6"/>
-          <p:cNvSpPr/>
-          <p:nvPr/>
-        </p:nvSpPr>
-        <p:spPr>
-          <a:xfrm>
-            <a:off x="4572000" y="0"/>
-            <a:ext cx="1152144" cy="5143500"/>
-          </a:xfrm>
-          <a:prstGeom prst="rect">
-            <a:avLst/>
-          </a:prstGeom>
-          <a:solidFill>
-            <a:srgbClr val="006EB5"/>
-          </a:solidFill>
-          <a:ln>
-            <a:noFill/>
-          </a:ln>
-        </p:spPr>
-        <p:style>
-          <a:lnRef idx="1">
-            <a:schemeClr val="accent1"/>
-          </a:lnRef>
-          <a:fillRef idx="3">
-            <a:schemeClr val="accent1"/>
-          </a:fillRef>
-          <a:effectRef idx="2">
-            <a:schemeClr val="accent1"/>
-          </a:effectRef>
-          <a:fontRef idx="minor">
-            <a:schemeClr val="lt1"/>
-          </a:fontRef>
-        </p:style>
-        <p:txBody>
-          <a:bodyPr rtlCol="0" anchor="ctr"/>
-          <a:lstStyle/>
-          <a:p>
-            <a:pPr algn="ctr"/>
-          </a:p>
-        </p:txBody>
-      </p:sp>
-      <p:sp>
-        <p:nvSpPr>
-          <p:cNvPr id="8" name="Rectangle 7"/>
-          <p:cNvSpPr/>
-          <p:nvPr/>
-        </p:nvSpPr>
-        <p:spPr>
-          <a:xfrm>
-            <a:off x="5715000" y="0"/>
-            <a:ext cx="1152144" cy="5143500"/>
-          </a:xfrm>
-          <a:prstGeom prst="rect">
-            <a:avLst/>
-          </a:prstGeom>
-          <a:solidFill>
-            <a:srgbClr val="0062AB"/>
-          </a:solidFill>
-          <a:ln>
-            <a:noFill/>
-          </a:ln>
-        </p:spPr>
-        <p:style>
-          <a:lnRef idx="1">
-            <a:schemeClr val="accent1"/>
-          </a:lnRef>
-          <a:fillRef idx="3">
-            <a:schemeClr val="accent1"/>
-          </a:fillRef>
-          <a:effectRef idx="2">
-            <a:schemeClr val="accent1"/>
-          </a:effectRef>
-          <a:fontRef idx="minor">
-            <a:schemeClr val="lt1"/>
-          </a:fontRef>
-        </p:style>
-        <p:txBody>
-          <a:bodyPr rtlCol="0" anchor="ctr"/>
-          <a:lstStyle/>
-          <a:p>
-            <a:pPr algn="ctr"/>
-          </a:p>
-        </p:txBody>
-      </p:sp>
-      <p:sp>
-        <p:nvSpPr>
-          <p:cNvPr id="9" name="Rectangle 8"/>
-          <p:cNvSpPr/>
-          <p:nvPr/>
-        </p:nvSpPr>
-        <p:spPr>
-          <a:xfrm>
-            <a:off x="6858000" y="0"/>
-            <a:ext cx="1152144" cy="5143500"/>
-          </a:xfrm>
-          <a:prstGeom prst="rect">
-            <a:avLst/>
-          </a:prstGeom>
-          <a:solidFill>
-            <a:srgbClr val="0057A1"/>
-          </a:solidFill>
-          <a:ln>
-            <a:noFill/>
-          </a:ln>
-        </p:spPr>
-        <p:style>
-          <a:lnRef idx="1">
-            <a:schemeClr val="accent1"/>
-          </a:lnRef>
-          <a:fillRef idx="3">
-            <a:schemeClr val="accent1"/>
-          </a:fillRef>
-          <a:effectRef idx="2">
-            <a:schemeClr val="accent1"/>
-          </a:effectRef>
-          <a:fontRef idx="minor">
-            <a:schemeClr val="lt1"/>
-          </a:fontRef>
-        </p:style>
-        <p:txBody>
-          <a:bodyPr rtlCol="0" anchor="ctr"/>
-          <a:lstStyle/>
-          <a:p>
-            <a:pPr algn="ctr"/>
-          </a:p>
-        </p:txBody>
-      </p:sp>
-      <p:sp>
-        <p:nvSpPr>
-          <p:cNvPr id="10" name="Rectangle 9"/>
-          <p:cNvSpPr/>
-          <p:nvPr/>
-        </p:nvSpPr>
-        <p:spPr>
-          <a:xfrm>
-            <a:off x="8001000" y="0"/>
-            <a:ext cx="1152144" cy="5143500"/>
-          </a:xfrm>
-          <a:prstGeom prst="rect">
-            <a:avLst/>
-          </a:prstGeom>
-          <a:solidFill>
-            <a:srgbClr val="004C97"/>
-          </a:solidFill>
-          <a:ln>
-            <a:noFill/>
-          </a:ln>
-        </p:spPr>
-        <p:style>
-          <a:lnRef idx="1">
-            <a:schemeClr val="accent1"/>
-          </a:lnRef>
-          <a:fillRef idx="3">
-            <a:schemeClr val="accent1"/>
-          </a:fillRef>
-          <a:effectRef idx="2">
-            <a:schemeClr val="accent1"/>
-          </a:effectRef>
-          <a:fontRef idx="minor">
-            <a:schemeClr val="lt1"/>
-          </a:fontRef>
-        </p:style>
-        <p:txBody>
-          <a:bodyPr rtlCol="0" anchor="ctr"/>
-          <a:lstStyle/>
-          <a:p>
-            <a:pPr algn="ctr"/>
-          </a:p>
-        </p:txBody>
-      </p:sp>
+      <p:grpSpPr>
+        <a:xfrm>
+          <a:off x="0" y="0"/>
+          <a:ext cx="0" cy="0"/>
+          <a:chOff x="0" y="0"/>
+          <a:chExt cx="0" cy="0"/>
+        </a:xfrm>
+      </p:grpSpPr>
       <p:sp>
         <p:nvSpPr>
           <p:cNvPr id="11" name="TextBox 10"/>
@@ -3508,7 +3145,7 @@
         <p:spPr>
           <a:xfrm>
             <a:off x="914400" y="1371600"/>
-            <a:ext cx="7315200" cy="1371600"/>
+            <a:ext cx="7315200" cy="769441"/>
           </a:xfrm>
           <a:prstGeom prst="rect">
             <a:avLst/>
@@ -3530,12 +3167,10 @@
               </a:defRPr>
             </a:pPr>
             <a:r>
-              <a:t>ESCALATION TO CLIENT</a:t>
-            </a:r>
-            <a:br/>
-            <a:r>
-              <a:t>DETAILS REPORT</a:t>
-            </a:r>
+              <a:rPr lang="en-US" sz="4400" dirty="0"/>
+              <a:t>Executive Business Review</a:t>
+            </a:r>
+            <a:endParaRPr sz="4400" dirty="0"/>
           </a:p>
         </p:txBody>
       </p:sp>
@@ -3570,6 +3205,7 @@
               </a:defRPr>
             </a:pPr>
             <a:r>
+              <a:rPr dirty="0"/>
               <a:t>Signature Tier</a:t>
             </a:r>
           </a:p>
@@ -3656,7 +3292,7 @@
         <p:spPr>
           <a:xfrm>
             <a:off x="457200" y="4732020"/>
-            <a:ext cx="2743200" cy="320040"/>
+            <a:ext cx="1061509" cy="230832"/>
           </a:xfrm>
           <a:prstGeom prst="rect">
             <a:avLst/>
@@ -3678,6 +3314,11 @@
               </a:defRPr>
             </a:pPr>
             <a:r>
+              <a:rPr dirty="0">
+                <a:solidFill>
+                  <a:schemeClr val="bg1"/>
+                </a:solidFill>
+              </a:rPr>
               <a:t>DECEMBER 2025</a:t>
             </a:r>
           </a:p>
@@ -3691,8 +3332,8 @@
         </p:nvSpPr>
         <p:spPr>
           <a:xfrm>
-            <a:off x="3200400" y="4732020"/>
-            <a:ext cx="2743200" cy="320040"/>
+            <a:off x="3854496" y="4732020"/>
+            <a:ext cx="1435008" cy="230832"/>
           </a:xfrm>
           <a:prstGeom prst="rect">
             <a:avLst/>
@@ -3714,6 +3355,11 @@
               </a:defRPr>
             </a:pPr>
             <a:r>
+              <a:rPr dirty="0">
+                <a:solidFill>
+                  <a:schemeClr val="bg1"/>
+                </a:solidFill>
+              </a:rPr>
               <a:t>©2025 CRITICAL START</a:t>
             </a:r>
           </a:p>
@@ -3727,8 +3373,8 @@
         </p:nvSpPr>
         <p:spPr>
           <a:xfrm>
-            <a:off x="5943600" y="4732020"/>
-            <a:ext cx="2743200" cy="320040"/>
+            <a:off x="8293744" y="4732020"/>
+            <a:ext cx="393056" cy="230832"/>
           </a:xfrm>
           <a:prstGeom prst="rect">
             <a:avLst/>
@@ -3750,6 +3396,11 @@
               </a:defRPr>
             </a:pPr>
             <a:r>
+              <a:rPr dirty="0">
+                <a:solidFill>
+                  <a:schemeClr val="bg1"/>
+                </a:solidFill>
+              </a:rPr>
               <a:t>EBR</a:t>
             </a:r>
           </a:p>
@@ -3786,6 +3437,7 @@
               </a:defRPr>
             </a:pPr>
             <a:r>
+              <a:rPr dirty="0"/>
               <a:t>Report Date: November 5, 2025</a:t>
             </a:r>
           </a:p>
@@ -3800,7 +3452,7 @@
 </file>
 
 <file path=ppt/slides/slide10.xml><?xml version="1.0" encoding="utf-8"?>
-<p:sld xmlns:a="http://schemas.openxmlformats.org/drawingml/2006/main" xmlns:p="http://schemas.openxmlformats.org/presentationml/2006/main" xmlns:r="http://schemas.openxmlformats.org/officeDocument/2006/relationships">
+<p:sld xmlns:a="http://schemas.openxmlformats.org/drawingml/2006/main" xmlns:r="http://schemas.openxmlformats.org/officeDocument/2006/relationships" xmlns:p="http://schemas.openxmlformats.org/presentationml/2006/main">
   <p:cSld>
     <p:spTree>
       <p:nvGrpSpPr>
@@ -3808,7 +3460,14 @@
         <p:cNvGrpSpPr/>
         <p:nvPr/>
       </p:nvGrpSpPr>
-      <p:grpSpPr/>
+      <p:grpSpPr>
+        <a:xfrm>
+          <a:off x="0" y="0"/>
+          <a:ext cx="0" cy="0"/>
+          <a:chOff x="0" y="0"/>
+          <a:chExt cx="0" cy="0"/>
+        </a:xfrm>
+      </p:grpSpPr>
       <p:sp>
         <p:nvSpPr>
           <p:cNvPr id="2" name="TextBox 1"/>
@@ -4034,7 +3693,7 @@
         <p:spPr>
           <a:xfrm>
             <a:off x="457200" y="640080"/>
-            <a:ext cx="7315200" cy="640080"/>
+            <a:ext cx="7315200" cy="707886"/>
           </a:xfrm>
           <a:prstGeom prst="rect">
             <a:avLst/>
@@ -4056,6 +3715,7 @@
               </a:defRPr>
             </a:pPr>
             <a:r>
+              <a:rPr sz="4000" dirty="0"/>
               <a:t>Detection Quality</a:t>
             </a:r>
           </a:p>
@@ -4103,6 +3763,7 @@
           <a:lstStyle/>
           <a:p>
             <a:pPr algn="ctr"/>
+            <a:endParaRPr/>
           </a:p>
         </p:txBody>
       </p:sp>
@@ -4173,6 +3834,7 @@
               </a:defRPr>
             </a:pPr>
             <a:r>
+              <a:rPr dirty="0"/>
               <a:t>31.4%</a:t>
             </a:r>
           </a:p>
@@ -4220,6 +3882,7 @@
           <a:lstStyle/>
           <a:p>
             <a:pPr algn="ctr"/>
+            <a:endParaRPr/>
           </a:p>
         </p:txBody>
       </p:sp>
@@ -4337,6 +4000,7 @@
           <a:lstStyle/>
           <a:p>
             <a:pPr algn="ctr"/>
+            <a:endParaRPr/>
           </a:p>
         </p:txBody>
       </p:sp>
@@ -4454,6 +4118,7 @@
           <a:lstStyle/>
           <a:p>
             <a:pPr algn="ctr"/>
+            <a:endParaRPr/>
           </a:p>
         </p:txBody>
       </p:sp>
@@ -4537,8 +4202,8 @@
         </p:nvSpPr>
         <p:spPr>
           <a:xfrm>
-            <a:off x="457200" y="4663440"/>
-            <a:ext cx="8229600" cy="640080"/>
+            <a:off x="457200" y="4389120"/>
+            <a:ext cx="8229600" cy="342900"/>
           </a:xfrm>
           <a:prstGeom prst="rect">
             <a:avLst/>
@@ -4579,6 +4244,7 @@
               </a:defRPr>
             </a:pPr>
             <a:r>
+              <a:rPr dirty="0"/>
               <a:t>Signal quality improved: false positives fell from 10.8% to 9.0%</a:t>
             </a:r>
           </a:p>
@@ -4593,7 +4259,7 @@
 </file>
 
 <file path=ppt/slides/slide11.xml><?xml version="1.0" encoding="utf-8"?>
-<p:sld xmlns:a="http://schemas.openxmlformats.org/drawingml/2006/main" xmlns:p="http://schemas.openxmlformats.org/presentationml/2006/main" xmlns:r="http://schemas.openxmlformats.org/officeDocument/2006/relationships">
+<p:sld xmlns:a="http://schemas.openxmlformats.org/drawingml/2006/main" xmlns:r="http://schemas.openxmlformats.org/officeDocument/2006/relationships" xmlns:p="http://schemas.openxmlformats.org/presentationml/2006/main">
   <p:cSld>
     <p:spTree>
       <p:nvGrpSpPr>
@@ -4601,7 +4267,14 @@
         <p:cNvGrpSpPr/>
         <p:nvPr/>
       </p:nvGrpSpPr>
-      <p:grpSpPr/>
+      <p:grpSpPr>
+        <a:xfrm>
+          <a:off x="0" y="0"/>
+          <a:ext cx="0" cy="0"/>
+          <a:chOff x="0" y="0"/>
+          <a:chExt cx="0" cy="0"/>
+        </a:xfrm>
+      </p:grpSpPr>
       <p:sp>
         <p:nvSpPr>
           <p:cNvPr id="2" name="TextBox 1"/>
@@ -4826,8 +4499,8 @@
         </p:nvSpPr>
         <p:spPr>
           <a:xfrm>
-            <a:off x="457200" y="640080"/>
-            <a:ext cx="7315200" cy="640080"/>
+            <a:off x="457200" y="480834"/>
+            <a:ext cx="7315200" cy="707886"/>
           </a:xfrm>
           <a:prstGeom prst="rect">
             <a:avLst/>
@@ -4849,43 +4522,8 @@
               </a:defRPr>
             </a:pPr>
             <a:r>
+              <a:rPr sz="4000" dirty="0"/>
               <a:t>Severity Alignment Flow</a:t>
-            </a:r>
-          </a:p>
-        </p:txBody>
-      </p:sp>
-      <p:sp>
-        <p:nvSpPr>
-          <p:cNvPr id="9" name="TextBox 8"/>
-          <p:cNvSpPr txBox="1"/>
-          <p:nvPr/>
-        </p:nvSpPr>
-        <p:spPr>
-          <a:xfrm>
-            <a:off x="457200" y="822960"/>
-            <a:ext cx="6858000" cy="365760"/>
-          </a:xfrm>
-          <a:prstGeom prst="rect">
-            <a:avLst/>
-          </a:prstGeom>
-          <a:noFill/>
-        </p:spPr>
-        <p:txBody>
-          <a:bodyPr wrap="square">
-            <a:spAutoFit/>
-          </a:bodyPr>
-          <a:lstStyle/>
-          <a:p>
-            <a:pPr algn="l">
-              <a:defRPr sz="1200">
-                <a:solidFill>
-                  <a:srgbClr val="343741"/>
-                </a:solidFill>
-                <a:latin typeface="Roboto"/>
-              </a:defRPr>
-            </a:pPr>
-            <a:r>
-              <a:t>Vendor-reported criticality vs. Critical Start adjudication</a:t>
             </a:r>
           </a:p>
         </p:txBody>
@@ -4898,7 +4536,7 @@
         </p:nvSpPr>
         <p:spPr>
           <a:xfrm>
-            <a:off x="6858000" y="822960"/>
+            <a:off x="6766560" y="660082"/>
             <a:ext cx="1645920" cy="365760"/>
           </a:xfrm>
           <a:prstGeom prst="rect">
@@ -4938,6 +4576,7 @@
               </a:defRPr>
             </a:pPr>
             <a:r>
+              <a:rPr dirty="0"/>
               <a:t>267 escalations</a:t>
             </a:r>
           </a:p>
@@ -4951,8 +4590,8 @@
         </p:nvSpPr>
         <p:spPr>
           <a:xfrm>
-            <a:off x="457200" y="1463040"/>
-            <a:ext cx="2377440" cy="1097280"/>
+            <a:off x="480061" y="1188720"/>
+            <a:ext cx="2047382" cy="1051560"/>
           </a:xfrm>
           <a:prstGeom prst="rect">
             <a:avLst/>
@@ -4985,6 +4624,7 @@
           <a:lstStyle/>
           <a:p>
             <a:pPr algn="ctr"/>
+            <a:endParaRPr/>
           </a:p>
         </p:txBody>
       </p:sp>
@@ -4996,8 +4636,8 @@
         </p:nvSpPr>
         <p:spPr>
           <a:xfrm>
-            <a:off x="548640" y="1645920"/>
-            <a:ext cx="2194560" cy="457200"/>
+            <a:off x="571501" y="1371600"/>
+            <a:ext cx="1889891" cy="646331"/>
           </a:xfrm>
           <a:prstGeom prst="rect">
             <a:avLst/>
@@ -5032,8 +4672,8 @@
         </p:nvSpPr>
         <p:spPr>
           <a:xfrm>
-            <a:off x="548640" y="2103120"/>
-            <a:ext cx="2194560" cy="365760"/>
+            <a:off x="571501" y="1828800"/>
+            <a:ext cx="1889891" cy="307777"/>
           </a:xfrm>
           <a:prstGeom prst="rect">
             <a:avLst/>
@@ -5068,8 +4708,8 @@
         </p:nvSpPr>
         <p:spPr>
           <a:xfrm>
-            <a:off x="3017520" y="1463040"/>
-            <a:ext cx="2377440" cy="1097280"/>
+            <a:off x="480061" y="2321040"/>
+            <a:ext cx="2047382" cy="1051560"/>
           </a:xfrm>
           <a:prstGeom prst="rect">
             <a:avLst/>
@@ -5102,6 +4742,7 @@
           <a:lstStyle/>
           <a:p>
             <a:pPr algn="ctr"/>
+            <a:endParaRPr/>
           </a:p>
         </p:txBody>
       </p:sp>
@@ -5113,8 +4754,8 @@
         </p:nvSpPr>
         <p:spPr>
           <a:xfrm>
-            <a:off x="3108960" y="1645920"/>
-            <a:ext cx="2194560" cy="457200"/>
+            <a:off x="571501" y="2503920"/>
+            <a:ext cx="1889891" cy="646331"/>
           </a:xfrm>
           <a:prstGeom prst="rect">
             <a:avLst/>
@@ -5149,8 +4790,8 @@
         </p:nvSpPr>
         <p:spPr>
           <a:xfrm>
-            <a:off x="3108960" y="2103120"/>
-            <a:ext cx="2194560" cy="365760"/>
+            <a:off x="571501" y="2961120"/>
+            <a:ext cx="1889891" cy="307777"/>
           </a:xfrm>
           <a:prstGeom prst="rect">
             <a:avLst/>
@@ -5185,8 +4826,8 @@
         </p:nvSpPr>
         <p:spPr>
           <a:xfrm>
-            <a:off x="5577840" y="1463040"/>
-            <a:ext cx="2377440" cy="1097280"/>
+            <a:off x="480061" y="3473779"/>
+            <a:ext cx="2047382" cy="1051560"/>
           </a:xfrm>
           <a:prstGeom prst="rect">
             <a:avLst/>
@@ -5219,6 +4860,7 @@
           <a:lstStyle/>
           <a:p>
             <a:pPr algn="ctr"/>
+            <a:endParaRPr dirty="0"/>
           </a:p>
         </p:txBody>
       </p:sp>
@@ -5230,8 +4872,8 @@
         </p:nvSpPr>
         <p:spPr>
           <a:xfrm>
-            <a:off x="5669280" y="1645920"/>
-            <a:ext cx="2194560" cy="457200"/>
+            <a:off x="571501" y="3656659"/>
+            <a:ext cx="1889891" cy="646331"/>
           </a:xfrm>
           <a:prstGeom prst="rect">
             <a:avLst/>
@@ -5266,8 +4908,8 @@
         </p:nvSpPr>
         <p:spPr>
           <a:xfrm>
-            <a:off x="5669280" y="2103120"/>
-            <a:ext cx="2194560" cy="365760"/>
+            <a:off x="571501" y="4113859"/>
+            <a:ext cx="1889891" cy="307777"/>
           </a:xfrm>
           <a:prstGeom prst="rect">
             <a:avLst/>
@@ -5302,8 +4944,8 @@
         </p:nvSpPr>
         <p:spPr>
           <a:xfrm>
-            <a:off x="731520" y="4846320"/>
-            <a:ext cx="7680960" cy="731520"/>
+            <a:off x="2857501" y="4110453"/>
+            <a:ext cx="5554979" cy="600164"/>
           </a:xfrm>
           <a:prstGeom prst="rect">
             <a:avLst/>
@@ -5325,47 +4967,15 @@
               </a:defRPr>
             </a:pPr>
             <a:r>
+              <a:rPr sz="1100" dirty="0"/>
               <a:t>• 34 escalations upgraded (12.7%) - CS raised severity based on business impact</a:t>
             </a:r>
-            <a:br/>
-            <a:r>
+            <a:br>
+              <a:rPr sz="1100" dirty="0"/>
+            </a:br>
+            <a:r>
+              <a:rPr sz="1100" dirty="0"/>
               <a:t>• 65 escalations de-escalated (24.3%) - CS reduced noise from vendor over-classification</a:t>
-            </a:r>
-          </a:p>
-        </p:txBody>
-      </p:sp>
-      <p:sp>
-        <p:nvSpPr>
-          <p:cNvPr id="22" name="TextBox 21"/>
-          <p:cNvSpPr txBox="1"/>
-          <p:nvPr/>
-        </p:nvSpPr>
-        <p:spPr>
-          <a:xfrm>
-            <a:off x="457200" y="4686300"/>
-            <a:ext cx="8229600" cy="274320"/>
-          </a:xfrm>
-          <a:prstGeom prst="rect">
-            <a:avLst/>
-          </a:prstGeom>
-          <a:noFill/>
-        </p:spPr>
-        <p:txBody>
-          <a:bodyPr wrap="square">
-            <a:spAutoFit/>
-          </a:bodyPr>
-          <a:lstStyle/>
-          <a:p>
-            <a:pPr algn="l">
-              <a:defRPr sz="1000" i="1">
-                <a:solidFill>
-                  <a:srgbClr val="343741"/>
-                </a:solidFill>
-                <a:latin typeface="Roboto"/>
-              </a:defRPr>
-            </a:pPr>
-            <a:r>
-              <a:t>Source: Vendor Severity (col 45) vs. Current Priority (col 13)</a:t>
             </a:r>
           </a:p>
         </p:txBody>
@@ -5386,8 +4996,8 @@
         </p:blipFill>
         <p:spPr>
           <a:xfrm>
-            <a:off x="2743200" y="2834640"/>
-            <a:ext cx="3657600" cy="1828800"/>
+            <a:off x="2857501" y="1183005"/>
+            <a:ext cx="5554979" cy="2777490"/>
           </a:xfrm>
           <a:prstGeom prst="rect">
             <a:avLst/>
@@ -5403,7 +5013,7 @@
 </file>
 
 <file path=ppt/slides/slide12.xml><?xml version="1.0" encoding="utf-8"?>
-<p:sld xmlns:a="http://schemas.openxmlformats.org/drawingml/2006/main" xmlns:p="http://schemas.openxmlformats.org/presentationml/2006/main" xmlns:r="http://schemas.openxmlformats.org/officeDocument/2006/relationships">
+<p:sld xmlns:a="http://schemas.openxmlformats.org/drawingml/2006/main" xmlns:r="http://schemas.openxmlformats.org/officeDocument/2006/relationships" xmlns:p="http://schemas.openxmlformats.org/presentationml/2006/main">
   <p:cSld>
     <p:spTree>
       <p:nvGrpSpPr>
@@ -5411,7 +5021,14 @@
         <p:cNvGrpSpPr/>
         <p:nvPr/>
       </p:nvGrpSpPr>
-      <p:grpSpPr/>
+      <p:grpSpPr>
+        <a:xfrm>
+          <a:off x="0" y="0"/>
+          <a:ext cx="0" cy="0"/>
+          <a:chOff x="0" y="0"/>
+          <a:chExt cx="0" cy="0"/>
+        </a:xfrm>
+      </p:grpSpPr>
       <p:sp>
         <p:nvSpPr>
           <p:cNvPr id="2" name="TextBox 1"/>
@@ -5637,7 +5254,7 @@
         <p:spPr>
           <a:xfrm>
             <a:off x="457200" y="640080"/>
-            <a:ext cx="7315200" cy="640080"/>
+            <a:ext cx="7315200" cy="584775"/>
           </a:xfrm>
           <a:prstGeom prst="rect">
             <a:avLst/>
@@ -5659,43 +5276,8 @@
               </a:defRPr>
             </a:pPr>
             <a:r>
+              <a:rPr sz="3200" dirty="0"/>
               <a:t>Threat Landscape by Tactic &amp; Severity</a:t>
-            </a:r>
-          </a:p>
-        </p:txBody>
-      </p:sp>
-      <p:sp>
-        <p:nvSpPr>
-          <p:cNvPr id="10" name="TextBox 9"/>
-          <p:cNvSpPr txBox="1"/>
-          <p:nvPr/>
-        </p:nvSpPr>
-        <p:spPr>
-          <a:xfrm>
-            <a:off x="731520" y="4389120"/>
-            <a:ext cx="7680960" cy="365760"/>
-          </a:xfrm>
-          <a:prstGeom prst="rect">
-            <a:avLst/>
-          </a:prstGeom>
-          <a:noFill/>
-        </p:spPr>
-        <p:txBody>
-          <a:bodyPr wrap="square">
-            <a:spAutoFit/>
-          </a:bodyPr>
-          <a:lstStyle/>
-          <a:p>
-            <a:pPr algn="ctr">
-              <a:defRPr sz="1200">
-                <a:solidFill>
-                  <a:srgbClr val="343741"/>
-                </a:solidFill>
-                <a:latin typeface="Roboto"/>
-              </a:defRPr>
-            </a:pPr>
-            <a:r>
-              <a:t>High (red) | Medium (orange) | Low (blue) | Info (gray)</a:t>
             </a:r>
           </a:p>
         </p:txBody>
@@ -5708,8 +5290,8 @@
         </p:nvSpPr>
         <p:spPr>
           <a:xfrm>
-            <a:off x="731520" y="4937760"/>
-            <a:ext cx="7680960" cy="548640"/>
+            <a:off x="731520" y="4229100"/>
+            <a:ext cx="7680960" cy="320040"/>
           </a:xfrm>
           <a:prstGeom prst="rect">
             <a:avLst/>
@@ -5750,43 +5332,8 @@
               </a:defRPr>
             </a:pPr>
             <a:r>
+              <a:rPr dirty="0"/>
               <a:t>Persistence tactics generated 77 escalations with 12 high-severity cases (15.6%)</a:t>
-            </a:r>
-          </a:p>
-        </p:txBody>
-      </p:sp>
-      <p:sp>
-        <p:nvSpPr>
-          <p:cNvPr id="12" name="TextBox 11"/>
-          <p:cNvSpPr txBox="1"/>
-          <p:nvPr/>
-        </p:nvSpPr>
-        <p:spPr>
-          <a:xfrm>
-            <a:off x="457200" y="4686300"/>
-            <a:ext cx="8229600" cy="274320"/>
-          </a:xfrm>
-          <a:prstGeom prst="rect">
-            <a:avLst/>
-          </a:prstGeom>
-          <a:noFill/>
-        </p:spPr>
-        <p:txBody>
-          <a:bodyPr wrap="square">
-            <a:spAutoFit/>
-          </a:bodyPr>
-          <a:lstStyle/>
-          <a:p>
-            <a:pPr algn="l">
-              <a:defRPr sz="1000" i="1">
-                <a:solidFill>
-                  <a:srgbClr val="343741"/>
-                </a:solidFill>
-                <a:latin typeface="Roboto"/>
-              </a:defRPr>
-            </a:pPr>
-            <a:r>
-              <a:t>Source: MITRE ATT&amp;CK Tactic (col X) and Current Priority (col 13)</a:t>
             </a:r>
           </a:p>
         </p:txBody>
@@ -5824,7 +5371,7 @@
 </file>
 
 <file path=ppt/slides/slide13.xml><?xml version="1.0" encoding="utf-8"?>
-<p:sld xmlns:a="http://schemas.openxmlformats.org/drawingml/2006/main" xmlns:p="http://schemas.openxmlformats.org/presentationml/2006/main" xmlns:r="http://schemas.openxmlformats.org/officeDocument/2006/relationships">
+<p:sld xmlns:a="http://schemas.openxmlformats.org/drawingml/2006/main" xmlns:r="http://schemas.openxmlformats.org/officeDocument/2006/relationships" xmlns:p="http://schemas.openxmlformats.org/presentationml/2006/main">
   <p:cSld>
     <p:spTree>
       <p:nvGrpSpPr>
@@ -5832,7 +5379,14 @@
         <p:cNvGrpSpPr/>
         <p:nvPr/>
       </p:nvGrpSpPr>
-      <p:grpSpPr/>
+      <p:grpSpPr>
+        <a:xfrm>
+          <a:off x="0" y="0"/>
+          <a:ext cx="0" cy="0"/>
+          <a:chOff x="0" y="0"/>
+          <a:chExt cx="0" cy="0"/>
+        </a:xfrm>
+      </p:grpSpPr>
       <p:sp>
         <p:nvSpPr>
           <p:cNvPr id="2" name="TextBox 1"/>
@@ -6058,7 +5612,7 @@
         <p:spPr>
           <a:xfrm>
             <a:off x="457200" y="640080"/>
-            <a:ext cx="7315200" cy="640080"/>
+            <a:ext cx="7315200" cy="646331"/>
           </a:xfrm>
           <a:prstGeom prst="rect">
             <a:avLst/>
@@ -6080,6 +5634,7 @@
               </a:defRPr>
             </a:pPr>
             <a:r>
+              <a:rPr sz="3600" dirty="0"/>
               <a:t>Detection Sources &amp; Quality</a:t>
             </a:r>
           </a:p>
@@ -6127,6 +5682,7 @@
           <a:lstStyle/>
           <a:p>
             <a:pPr algn="ctr"/>
+            <a:endParaRPr/>
           </a:p>
         </p:txBody>
       </p:sp>
@@ -6211,7 +5767,7 @@
         <p:spPr>
           <a:xfrm>
             <a:off x="594360" y="3200400"/>
-            <a:ext cx="2103120" cy="914400"/>
+            <a:ext cx="2103120" cy="457200"/>
           </a:xfrm>
           <a:prstGeom prst="rect">
             <a:avLst/>
@@ -6333,6 +5889,7 @@
           <a:lstStyle/>
           <a:p>
             <a:pPr algn="ctr"/>
+            <a:endParaRPr/>
           </a:p>
         </p:txBody>
       </p:sp>
@@ -6417,7 +5974,7 @@
         <p:spPr>
           <a:xfrm>
             <a:off x="3154680" y="3200400"/>
-            <a:ext cx="2103120" cy="914400"/>
+            <a:ext cx="2103120" cy="457200"/>
           </a:xfrm>
           <a:prstGeom prst="rect">
             <a:avLst/>
@@ -6539,6 +6096,7 @@
           <a:lstStyle/>
           <a:p>
             <a:pPr algn="ctr"/>
+            <a:endParaRPr/>
           </a:p>
         </p:txBody>
       </p:sp>
@@ -6623,7 +6181,7 @@
         <p:spPr>
           <a:xfrm>
             <a:off x="5715000" y="3200400"/>
-            <a:ext cx="2103120" cy="914400"/>
+            <a:ext cx="2103120" cy="457200"/>
           </a:xfrm>
           <a:prstGeom prst="rect">
             <a:avLst/>
@@ -6712,7 +6270,7 @@
 </file>
 
 <file path=ppt/slides/slide14.xml><?xml version="1.0" encoding="utf-8"?>
-<p:sld xmlns:a="http://schemas.openxmlformats.org/drawingml/2006/main" xmlns:p="http://schemas.openxmlformats.org/presentationml/2006/main" xmlns:r="http://schemas.openxmlformats.org/officeDocument/2006/relationships">
+<p:sld xmlns:a="http://schemas.openxmlformats.org/drawingml/2006/main" xmlns:r="http://schemas.openxmlformats.org/officeDocument/2006/relationships" xmlns:p="http://schemas.openxmlformats.org/presentationml/2006/main">
   <p:cSld>
     <p:spTree>
       <p:nvGrpSpPr>
@@ -6720,7 +6278,14 @@
         <p:cNvGrpSpPr/>
         <p:nvPr/>
       </p:nvGrpSpPr>
-      <p:grpSpPr/>
+      <p:grpSpPr>
+        <a:xfrm>
+          <a:off x="0" y="0"/>
+          <a:ext cx="0" cy="0"/>
+          <a:chOff x="0" y="0"/>
+          <a:chExt cx="0" cy="0"/>
+        </a:xfrm>
+      </p:grpSpPr>
       <p:sp>
         <p:nvSpPr>
           <p:cNvPr id="2" name="TextBox 1"/>
@@ -6837,16 +6402,16 @@
         </p:nvSpPr>
         <p:spPr>
           <a:xfrm>
-            <a:off x="457200" y="4732020"/>
-            <a:ext cx="2743200" cy="320040"/>
-          </a:xfrm>
-          <a:prstGeom prst="rect">
-            <a:avLst/>
-          </a:prstGeom>
-          <a:noFill/>
-        </p:spPr>
-        <p:txBody>
-          <a:bodyPr wrap="none">
+            <a:off x="457200" y="4123403"/>
+            <a:ext cx="2743200" cy="230832"/>
+          </a:xfrm>
+          <a:prstGeom prst="rect">
+            <a:avLst/>
+          </a:prstGeom>
+          <a:noFill/>
+        </p:spPr>
+        <p:txBody>
+          <a:bodyPr wrap="square">
             <a:spAutoFit/>
           </a:bodyPr>
           <a:lstStyle/>
@@ -6873,16 +6438,16 @@
         </p:nvSpPr>
         <p:spPr>
           <a:xfrm>
-            <a:off x="3200400" y="4732020"/>
-            <a:ext cx="2743200" cy="320040"/>
-          </a:xfrm>
-          <a:prstGeom prst="rect">
-            <a:avLst/>
-          </a:prstGeom>
-          <a:noFill/>
-        </p:spPr>
-        <p:txBody>
-          <a:bodyPr wrap="none">
+            <a:off x="3200400" y="4123403"/>
+            <a:ext cx="2743200" cy="230832"/>
+          </a:xfrm>
+          <a:prstGeom prst="rect">
+            <a:avLst/>
+          </a:prstGeom>
+          <a:noFill/>
+        </p:spPr>
+        <p:txBody>
+          <a:bodyPr wrap="square">
             <a:spAutoFit/>
           </a:bodyPr>
           <a:lstStyle/>
@@ -6909,16 +6474,16 @@
         </p:nvSpPr>
         <p:spPr>
           <a:xfrm>
-            <a:off x="5943600" y="4732020"/>
-            <a:ext cx="2743200" cy="320040"/>
-          </a:xfrm>
-          <a:prstGeom prst="rect">
-            <a:avLst/>
-          </a:prstGeom>
-          <a:noFill/>
-        </p:spPr>
-        <p:txBody>
-          <a:bodyPr wrap="none">
+            <a:off x="5943600" y="4123403"/>
+            <a:ext cx="2743200" cy="230832"/>
+          </a:xfrm>
+          <a:prstGeom prst="rect">
+            <a:avLst/>
+          </a:prstGeom>
+          <a:noFill/>
+        </p:spPr>
+        <p:txBody>
+          <a:bodyPr wrap="square">
             <a:spAutoFit/>
           </a:bodyPr>
           <a:lstStyle/>
@@ -6946,7 +6511,7 @@
         <p:spPr>
           <a:xfrm>
             <a:off x="457200" y="640080"/>
-            <a:ext cx="7315200" cy="640080"/>
+            <a:ext cx="7315200" cy="646331"/>
           </a:xfrm>
           <a:prstGeom prst="rect">
             <a:avLst/>
@@ -6968,6 +6533,7 @@
               </a:defRPr>
             </a:pPr>
             <a:r>
+              <a:rPr sz="3600" dirty="0"/>
               <a:t>Prioritized Improvement Plan</a:t>
             </a:r>
           </a:p>
@@ -6981,8 +6547,8 @@
         </p:nvSpPr>
         <p:spPr>
           <a:xfrm>
-            <a:off x="457200" y="1463040"/>
-            <a:ext cx="8229600" cy="1188720"/>
+            <a:off x="457200" y="1286411"/>
+            <a:ext cx="8229600" cy="1012091"/>
           </a:xfrm>
           <a:prstGeom prst="rect">
             <a:avLst/>
@@ -7015,6 +6581,7 @@
           <a:lstStyle/>
           <a:p>
             <a:pPr algn="ctr"/>
+            <a:endParaRPr/>
           </a:p>
         </p:txBody>
       </p:sp>
@@ -7026,8 +6593,8 @@
         </p:nvSpPr>
         <p:spPr>
           <a:xfrm>
-            <a:off x="640080" y="1600200"/>
-            <a:ext cx="914400" cy="320040"/>
+            <a:off x="640080" y="1423571"/>
+            <a:ext cx="914400" cy="272486"/>
           </a:xfrm>
           <a:prstGeom prst="rect">
             <a:avLst/>
@@ -7079,8 +6646,8 @@
         </p:nvSpPr>
         <p:spPr>
           <a:xfrm>
-            <a:off x="1737360" y="1600200"/>
-            <a:ext cx="6766560" cy="320040"/>
+            <a:off x="1737360" y="1423571"/>
+            <a:ext cx="6766560" cy="338554"/>
           </a:xfrm>
           <a:prstGeom prst="rect">
             <a:avLst/>
@@ -7115,8 +6682,8 @@
         </p:nvSpPr>
         <p:spPr>
           <a:xfrm>
-            <a:off x="640080" y="2057400"/>
-            <a:ext cx="7863840" cy="365760"/>
+            <a:off x="640080" y="1880771"/>
+            <a:ext cx="7863840" cy="430887"/>
           </a:xfrm>
           <a:prstGeom prst="rect">
             <a:avLst/>
@@ -7138,42 +6705,22 @@
               </a:defRPr>
             </a:pPr>
             <a:r>
+              <a:rPr sz="1100" dirty="0"/>
               <a:t>Palo Alto Cortex XDR false positive rate is 11.2%, exceeding the 10.0% threshold</a:t>
             </a:r>
-          </a:p>
-        </p:txBody>
-      </p:sp>
-      <p:sp>
-        <p:nvSpPr>
-          <p:cNvPr id="13" name="TextBox 12"/>
-          <p:cNvSpPr txBox="1"/>
-          <p:nvPr/>
-        </p:nvSpPr>
-        <p:spPr>
-          <a:xfrm>
-            <a:off x="640080" y="2514600"/>
-            <a:ext cx="7863840" cy="320040"/>
-          </a:xfrm>
-          <a:prstGeom prst="rect">
-            <a:avLst/>
-          </a:prstGeom>
-          <a:noFill/>
-        </p:spPr>
-        <p:txBody>
-          <a:bodyPr wrap="square">
-            <a:spAutoFit/>
-          </a:bodyPr>
-          <a:lstStyle/>
-          <a:p>
-            <a:pPr algn="l">
-              <a:defRPr sz="1100">
-                <a:solidFill>
-                  <a:srgbClr val="343741"/>
-                </a:solidFill>
-                <a:latin typeface="Roboto"/>
-              </a:defRPr>
-            </a:pPr>
-            <a:r>
+            <a:endParaRPr lang="en-US" sz="1100" dirty="0"/>
+          </a:p>
+          <a:p>
+            <a:pPr>
+              <a:defRPr sz="1200">
+                <a:solidFill>
+                  <a:srgbClr val="343741"/>
+                </a:solidFill>
+                <a:latin typeface="Roboto"/>
+              </a:defRPr>
+            </a:pPr>
+            <a:r>
+              <a:rPr lang="en-US" sz="1100" dirty="0"/>
               <a:t>Owner: CS SOC + Lennar Security Team | Target: Next 30 days</a:t>
             </a:r>
           </a:p>
@@ -7187,8 +6734,8 @@
         </p:nvSpPr>
         <p:spPr>
           <a:xfrm>
-            <a:off x="640080" y="2880360"/>
-            <a:ext cx="7863840" cy="320040"/>
+            <a:off x="640080" y="2481382"/>
+            <a:ext cx="7863840" cy="261610"/>
           </a:xfrm>
           <a:prstGeom prst="rect">
             <a:avLst/>
@@ -7223,8 +6770,8 @@
         </p:nvSpPr>
         <p:spPr>
           <a:xfrm>
-            <a:off x="457200" y="2834640"/>
-            <a:ext cx="8229600" cy="1188720"/>
+            <a:off x="457200" y="2435662"/>
+            <a:ext cx="8229600" cy="1012091"/>
           </a:xfrm>
           <a:prstGeom prst="rect">
             <a:avLst/>
@@ -7257,6 +6804,7 @@
           <a:lstStyle/>
           <a:p>
             <a:pPr algn="ctr"/>
+            <a:endParaRPr/>
           </a:p>
         </p:txBody>
       </p:sp>
@@ -7268,8 +6816,8 @@
         </p:nvSpPr>
         <p:spPr>
           <a:xfrm>
-            <a:off x="640080" y="2971800"/>
-            <a:ext cx="914400" cy="320040"/>
+            <a:off x="640080" y="2572822"/>
+            <a:ext cx="914400" cy="272486"/>
           </a:xfrm>
           <a:prstGeom prst="rect">
             <a:avLst/>
@@ -7321,8 +6869,8 @@
         </p:nvSpPr>
         <p:spPr>
           <a:xfrm>
-            <a:off x="1737360" y="2971800"/>
-            <a:ext cx="6766560" cy="320040"/>
+            <a:off x="1737360" y="2572822"/>
+            <a:ext cx="6766560" cy="338554"/>
           </a:xfrm>
           <a:prstGeom prst="rect">
             <a:avLst/>
@@ -7357,8 +6905,8 @@
         </p:nvSpPr>
         <p:spPr>
           <a:xfrm>
-            <a:off x="640080" y="3429000"/>
-            <a:ext cx="7863840" cy="365760"/>
+            <a:off x="640080" y="3030022"/>
+            <a:ext cx="7863840" cy="430887"/>
           </a:xfrm>
           <a:prstGeom prst="rect">
             <a:avLst/>
@@ -7380,42 +6928,22 @@
               </a:defRPr>
             </a:pPr>
             <a:r>
+              <a:rPr sz="1100" dirty="0"/>
               <a:t>Manual escalations at 14% exceed 12% target. 38 incidents required analyst judgment</a:t>
             </a:r>
-          </a:p>
-        </p:txBody>
-      </p:sp>
-      <p:sp>
-        <p:nvSpPr>
-          <p:cNvPr id="19" name="TextBox 18"/>
-          <p:cNvSpPr txBox="1"/>
-          <p:nvPr/>
-        </p:nvSpPr>
-        <p:spPr>
-          <a:xfrm>
-            <a:off x="640080" y="3886200"/>
-            <a:ext cx="7863840" cy="320040"/>
-          </a:xfrm>
-          <a:prstGeom prst="rect">
-            <a:avLst/>
-          </a:prstGeom>
-          <a:noFill/>
-        </p:spPr>
-        <p:txBody>
-          <a:bodyPr wrap="square">
-            <a:spAutoFit/>
-          </a:bodyPr>
-          <a:lstStyle/>
-          <a:p>
-            <a:pPr algn="l">
-              <a:defRPr sz="1100">
-                <a:solidFill>
-                  <a:srgbClr val="343741"/>
-                </a:solidFill>
-                <a:latin typeface="Roboto"/>
-              </a:defRPr>
-            </a:pPr>
-            <a:r>
+            <a:endParaRPr lang="en-US" sz="1100" dirty="0"/>
+          </a:p>
+          <a:p>
+            <a:pPr>
+              <a:defRPr sz="1200">
+                <a:solidFill>
+                  <a:srgbClr val="343741"/>
+                </a:solidFill>
+                <a:latin typeface="Roboto"/>
+              </a:defRPr>
+            </a:pPr>
+            <a:r>
+              <a:rPr lang="en-US" sz="1100" dirty="0"/>
               <a:t>Owner: CS SOC Engineering | Target: Next 60 days</a:t>
             </a:r>
           </a:p>
@@ -7429,8 +6957,8 @@
         </p:nvSpPr>
         <p:spPr>
           <a:xfrm>
-            <a:off x="640080" y="4251960"/>
-            <a:ext cx="7863840" cy="320040"/>
+            <a:off x="640080" y="3643343"/>
+            <a:ext cx="7863840" cy="261610"/>
           </a:xfrm>
           <a:prstGeom prst="rect">
             <a:avLst/>
@@ -7465,8 +6993,8 @@
         </p:nvSpPr>
         <p:spPr>
           <a:xfrm>
-            <a:off x="457200" y="4206240"/>
-            <a:ext cx="8229600" cy="1188720"/>
+            <a:off x="457200" y="3597623"/>
+            <a:ext cx="8229600" cy="1012091"/>
           </a:xfrm>
           <a:prstGeom prst="rect">
             <a:avLst/>
@@ -7499,6 +7027,7 @@
           <a:lstStyle/>
           <a:p>
             <a:pPr algn="ctr"/>
+            <a:endParaRPr/>
           </a:p>
         </p:txBody>
       </p:sp>
@@ -7510,7 +7039,7 @@
         </p:nvSpPr>
         <p:spPr>
           <a:xfrm>
-            <a:off x="640080" y="4343400"/>
+            <a:off x="640080" y="3734783"/>
             <a:ext cx="914400" cy="320040"/>
           </a:xfrm>
           <a:prstGeom prst="rect">
@@ -7563,8 +7092,8 @@
         </p:nvSpPr>
         <p:spPr>
           <a:xfrm>
-            <a:off x="1737360" y="4343400"/>
-            <a:ext cx="6766560" cy="320040"/>
+            <a:off x="1737360" y="3734783"/>
+            <a:ext cx="6766560" cy="338554"/>
           </a:xfrm>
           <a:prstGeom prst="rect">
             <a:avLst/>
@@ -7599,8 +7128,8 @@
         </p:nvSpPr>
         <p:spPr>
           <a:xfrm>
-            <a:off x="640080" y="4800600"/>
-            <a:ext cx="7863840" cy="365760"/>
+            <a:off x="640080" y="4191983"/>
+            <a:ext cx="7863840" cy="430887"/>
           </a:xfrm>
           <a:prstGeom prst="rect">
             <a:avLst/>
@@ -7622,42 +7151,22 @@
               </a:defRPr>
             </a:pPr>
             <a:r>
+              <a:rPr sz="1100" dirty="0"/>
               <a:t>Persistence + Defense Evasion account for 67% of high-severity incidents</a:t>
             </a:r>
-          </a:p>
-        </p:txBody>
-      </p:sp>
-      <p:sp>
-        <p:nvSpPr>
-          <p:cNvPr id="25" name="TextBox 24"/>
-          <p:cNvSpPr txBox="1"/>
-          <p:nvPr/>
-        </p:nvSpPr>
-        <p:spPr>
-          <a:xfrm>
-            <a:off x="640080" y="5257800"/>
-            <a:ext cx="7863840" cy="320040"/>
-          </a:xfrm>
-          <a:prstGeom prst="rect">
-            <a:avLst/>
-          </a:prstGeom>
-          <a:noFill/>
-        </p:spPr>
-        <p:txBody>
-          <a:bodyPr wrap="square">
-            <a:spAutoFit/>
-          </a:bodyPr>
-          <a:lstStyle/>
-          <a:p>
-            <a:pPr algn="l">
-              <a:defRPr sz="1100">
-                <a:solidFill>
-                  <a:srgbClr val="343741"/>
-                </a:solidFill>
-                <a:latin typeface="Roboto"/>
-              </a:defRPr>
-            </a:pPr>
-            <a:r>
+            <a:endParaRPr lang="en-US" sz="1100" dirty="0"/>
+          </a:p>
+          <a:p>
+            <a:pPr>
+              <a:defRPr sz="1200">
+                <a:solidFill>
+                  <a:srgbClr val="343741"/>
+                </a:solidFill>
+                <a:latin typeface="Roboto"/>
+              </a:defRPr>
+            </a:pPr>
+            <a:r>
+              <a:rPr lang="en-US" sz="1100" dirty="0"/>
               <a:t>Owner: Joint - CS Threat Intel + Lennar | Target: Ongoing</a:t>
             </a:r>
           </a:p>
@@ -7671,7 +7180,7 @@
         </p:nvSpPr>
         <p:spPr>
           <a:xfrm>
-            <a:off x="640080" y="5623560"/>
+            <a:off x="457200" y="4759584"/>
             <a:ext cx="7863840" cy="320040"/>
           </a:xfrm>
           <a:prstGeom prst="rect">
@@ -7694,6 +7203,7 @@
               </a:defRPr>
             </a:pPr>
             <a:r>
+              <a:rPr dirty="0"/>
               <a:t>Expected Impact: Improved detection of advanced threats</a:t>
             </a:r>
           </a:p>
@@ -7708,7 +7218,7 @@
 </file>
 
 <file path=ppt/slides/slide15.xml><?xml version="1.0" encoding="utf-8"?>
-<p:sld xmlns:a="http://schemas.openxmlformats.org/drawingml/2006/main" xmlns:p="http://schemas.openxmlformats.org/presentationml/2006/main" xmlns:r="http://schemas.openxmlformats.org/officeDocument/2006/relationships">
+<p:sld xmlns:a="http://schemas.openxmlformats.org/drawingml/2006/main" xmlns:r="http://schemas.openxmlformats.org/officeDocument/2006/relationships" xmlns:p="http://schemas.openxmlformats.org/presentationml/2006/main">
   <p:cSld>
     <p:spTree>
       <p:nvGrpSpPr>
@@ -7716,7 +7226,14 @@
         <p:cNvGrpSpPr/>
         <p:nvPr/>
       </p:nvGrpSpPr>
-      <p:grpSpPr/>
+      <p:grpSpPr>
+        <a:xfrm>
+          <a:off x="0" y="0"/>
+          <a:ext cx="0" cy="0"/>
+          <a:chOff x="0" y="0"/>
+          <a:chExt cx="0" cy="0"/>
+        </a:xfrm>
+      </p:grpSpPr>
       <p:sp>
         <p:nvSpPr>
           <p:cNvPr id="2" name="TextBox 1"/>
@@ -7833,16 +7350,16 @@
         </p:nvSpPr>
         <p:spPr>
           <a:xfrm>
-            <a:off x="457200" y="4732020"/>
-            <a:ext cx="2743200" cy="320040"/>
-          </a:xfrm>
-          <a:prstGeom prst="rect">
-            <a:avLst/>
-          </a:prstGeom>
-          <a:noFill/>
-        </p:spPr>
-        <p:txBody>
-          <a:bodyPr wrap="none">
+            <a:off x="548640" y="4597276"/>
+            <a:ext cx="2408663" cy="230832"/>
+          </a:xfrm>
+          <a:prstGeom prst="rect">
+            <a:avLst/>
+          </a:prstGeom>
+          <a:noFill/>
+        </p:spPr>
+        <p:txBody>
+          <a:bodyPr wrap="square">
             <a:spAutoFit/>
           </a:bodyPr>
           <a:lstStyle/>
@@ -7869,16 +7386,16 @@
         </p:nvSpPr>
         <p:spPr>
           <a:xfrm>
-            <a:off x="3200400" y="4732020"/>
-            <a:ext cx="2743200" cy="320040"/>
-          </a:xfrm>
-          <a:prstGeom prst="rect">
-            <a:avLst/>
-          </a:prstGeom>
-          <a:noFill/>
-        </p:spPr>
-        <p:txBody>
-          <a:bodyPr wrap="none">
+            <a:off x="3291840" y="4597276"/>
+            <a:ext cx="2408663" cy="230832"/>
+          </a:xfrm>
+          <a:prstGeom prst="rect">
+            <a:avLst/>
+          </a:prstGeom>
+          <a:noFill/>
+        </p:spPr>
+        <p:txBody>
+          <a:bodyPr wrap="square">
             <a:spAutoFit/>
           </a:bodyPr>
           <a:lstStyle/>
@@ -7905,16 +7422,16 @@
         </p:nvSpPr>
         <p:spPr>
           <a:xfrm>
-            <a:off x="5943600" y="4732020"/>
-            <a:ext cx="2743200" cy="320040"/>
-          </a:xfrm>
-          <a:prstGeom prst="rect">
-            <a:avLst/>
-          </a:prstGeom>
-          <a:noFill/>
-        </p:spPr>
-        <p:txBody>
-          <a:bodyPr wrap="none">
+            <a:off x="6035040" y="4597276"/>
+            <a:ext cx="2408663" cy="230832"/>
+          </a:xfrm>
+          <a:prstGeom prst="rect">
+            <a:avLst/>
+          </a:prstGeom>
+          <a:noFill/>
+        </p:spPr>
+        <p:txBody>
+          <a:bodyPr wrap="square">
             <a:spAutoFit/>
           </a:bodyPr>
           <a:lstStyle/>
@@ -7942,7 +7459,7 @@
         <p:spPr>
           <a:xfrm>
             <a:off x="457200" y="640080"/>
-            <a:ext cx="7315200" cy="640080"/>
+            <a:ext cx="7315200" cy="707886"/>
           </a:xfrm>
           <a:prstGeom prst="rect">
             <a:avLst/>
@@ -7964,6 +7481,7 @@
               </a:defRPr>
             </a:pPr>
             <a:r>
+              <a:rPr sz="4000" dirty="0"/>
               <a:t>Operational Insights</a:t>
             </a:r>
           </a:p>
@@ -7977,8 +7495,8 @@
         </p:nvSpPr>
         <p:spPr>
           <a:xfrm>
-            <a:off x="457200" y="1463040"/>
-            <a:ext cx="3749040" cy="2926080"/>
+            <a:off x="548640" y="1347966"/>
+            <a:ext cx="3291840" cy="2648361"/>
           </a:xfrm>
           <a:prstGeom prst="rect">
             <a:avLst/>
@@ -8011,6 +7529,7 @@
           <a:lstStyle/>
           <a:p>
             <a:pPr algn="ctr"/>
+            <a:endParaRPr/>
           </a:p>
         </p:txBody>
       </p:sp>
@@ -8022,8 +7541,8 @@
         </p:nvSpPr>
         <p:spPr>
           <a:xfrm>
-            <a:off x="640080" y="1645920"/>
-            <a:ext cx="3383280" cy="365760"/>
+            <a:off x="731520" y="1511520"/>
+            <a:ext cx="2970685" cy="369332"/>
           </a:xfrm>
           <a:prstGeom prst="rect">
             <a:avLst/>
@@ -8058,8 +7577,8 @@
         </p:nvSpPr>
         <p:spPr>
           <a:xfrm>
-            <a:off x="640080" y="2286000"/>
-            <a:ext cx="3383280" cy="457200"/>
+            <a:off x="731520" y="2152290"/>
+            <a:ext cx="2970685" cy="307777"/>
           </a:xfrm>
           <a:prstGeom prst="rect">
             <a:avLst/>
@@ -8094,8 +7613,8 @@
         </p:nvSpPr>
         <p:spPr>
           <a:xfrm>
-            <a:off x="640080" y="2926080"/>
-            <a:ext cx="3383280" cy="457200"/>
+            <a:off x="731520" y="2792370"/>
+            <a:ext cx="2970685" cy="307777"/>
           </a:xfrm>
           <a:prstGeom prst="rect">
             <a:avLst/>
@@ -8130,8 +7649,8 @@
         </p:nvSpPr>
         <p:spPr>
           <a:xfrm>
-            <a:off x="640080" y="3566160"/>
-            <a:ext cx="3383280" cy="457200"/>
+            <a:off x="731520" y="3432450"/>
+            <a:ext cx="2970685" cy="307777"/>
           </a:xfrm>
           <a:prstGeom prst="rect">
             <a:avLst/>
@@ -8166,8 +7685,8 @@
         </p:nvSpPr>
         <p:spPr>
           <a:xfrm>
-            <a:off x="4480560" y="1463040"/>
-            <a:ext cx="3749040" cy="2926080"/>
+            <a:off x="4572000" y="1347966"/>
+            <a:ext cx="3291840" cy="2648361"/>
           </a:xfrm>
           <a:prstGeom prst="rect">
             <a:avLst/>
@@ -8200,6 +7719,7 @@
           <a:lstStyle/>
           <a:p>
             <a:pPr algn="ctr"/>
+            <a:endParaRPr/>
           </a:p>
         </p:txBody>
       </p:sp>
@@ -8211,8 +7731,8 @@
         </p:nvSpPr>
         <p:spPr>
           <a:xfrm>
-            <a:off x="4663440" y="1645920"/>
-            <a:ext cx="3383280" cy="365760"/>
+            <a:off x="4754880" y="1511520"/>
+            <a:ext cx="2970685" cy="369332"/>
           </a:xfrm>
           <a:prstGeom prst="rect">
             <a:avLst/>
@@ -8247,8 +7767,8 @@
         </p:nvSpPr>
         <p:spPr>
           <a:xfrm>
-            <a:off x="4663440" y="2286000"/>
-            <a:ext cx="3383280" cy="457200"/>
+            <a:off x="4754880" y="2152290"/>
+            <a:ext cx="2970685" cy="307777"/>
           </a:xfrm>
           <a:prstGeom prst="rect">
             <a:avLst/>
@@ -8283,8 +7803,8 @@
         </p:nvSpPr>
         <p:spPr>
           <a:xfrm>
-            <a:off x="4663440" y="2926080"/>
-            <a:ext cx="3383280" cy="457200"/>
+            <a:off x="4754880" y="2792370"/>
+            <a:ext cx="2970685" cy="307777"/>
           </a:xfrm>
           <a:prstGeom prst="rect">
             <a:avLst/>
@@ -8319,8 +7839,8 @@
         </p:nvSpPr>
         <p:spPr>
           <a:xfrm>
-            <a:off x="4663440" y="3566160"/>
-            <a:ext cx="3383280" cy="457200"/>
+            <a:off x="4754880" y="3432450"/>
+            <a:ext cx="2970685" cy="307777"/>
           </a:xfrm>
           <a:prstGeom prst="rect">
             <a:avLst/>
@@ -8355,8 +7875,8 @@
         </p:nvSpPr>
         <p:spPr>
           <a:xfrm>
-            <a:off x="457200" y="4663440"/>
-            <a:ext cx="8229600" cy="640080"/>
+            <a:off x="548640" y="4135388"/>
+            <a:ext cx="7225990" cy="298896"/>
           </a:xfrm>
           <a:prstGeom prst="rect">
             <a:avLst/>
@@ -8397,6 +7917,7 @@
               </a:defRPr>
             </a:pPr>
             <a:r>
+              <a:rPr sz="1200" dirty="0"/>
               <a:t>82.5% of after-hours alerts handled by CS SOC without requiring customer notification</a:t>
             </a:r>
           </a:p>
@@ -8411,7 +7932,7 @@
 </file>
 
 <file path=ppt/slides/slide16.xml><?xml version="1.0" encoding="utf-8"?>
-<p:sld xmlns:a="http://schemas.openxmlformats.org/drawingml/2006/main" xmlns:p="http://schemas.openxmlformats.org/presentationml/2006/main" xmlns:r="http://schemas.openxmlformats.org/officeDocument/2006/relationships">
+<p:sld xmlns:a="http://schemas.openxmlformats.org/drawingml/2006/main" xmlns:r="http://schemas.openxmlformats.org/officeDocument/2006/relationships" xmlns:p="http://schemas.openxmlformats.org/presentationml/2006/main">
   <p:cSld>
     <p:spTree>
       <p:nvGrpSpPr>
@@ -8419,7 +7940,14 @@
         <p:cNvGrpSpPr/>
         <p:nvPr/>
       </p:nvGrpSpPr>
-      <p:grpSpPr/>
+      <p:grpSpPr>
+        <a:xfrm>
+          <a:off x="0" y="0"/>
+          <a:ext cx="0" cy="0"/>
+          <a:chOff x="0" y="0"/>
+          <a:chExt cx="0" cy="0"/>
+        </a:xfrm>
+      </p:grpSpPr>
       <p:sp>
         <p:nvSpPr>
           <p:cNvPr id="2" name="TextBox 1"/>
@@ -8645,7 +8173,7 @@
         <p:spPr>
           <a:xfrm>
             <a:off x="457200" y="640080"/>
-            <a:ext cx="7315200" cy="640080"/>
+            <a:ext cx="7315200" cy="584775"/>
           </a:xfrm>
           <a:prstGeom prst="rect">
             <a:avLst/>
@@ -8667,6 +8195,7 @@
               </a:defRPr>
             </a:pPr>
             <a:r>
+              <a:rPr sz="3200" dirty="0"/>
               <a:t>After-Hours Customer Notifications</a:t>
             </a:r>
           </a:p>
@@ -8681,7 +8210,7 @@
         <p:spPr>
           <a:xfrm>
             <a:off x="457200" y="1463040"/>
-            <a:ext cx="2743200" cy="1371600"/>
+            <a:ext cx="2743200" cy="1015663"/>
           </a:xfrm>
           <a:prstGeom prst="rect">
             <a:avLst/>
@@ -8703,6 +8232,7 @@
               </a:defRPr>
             </a:pPr>
             <a:r>
+              <a:rPr sz="6000" dirty="0"/>
               <a:t>158</a:t>
             </a:r>
           </a:p>
@@ -8739,6 +8269,7 @@
               </a:defRPr>
             </a:pPr>
             <a:r>
+              <a:rPr dirty="0"/>
               <a:t>After-Hours Escalations</a:t>
             </a:r>
           </a:p>
@@ -8753,7 +8284,7 @@
         <p:spPr>
           <a:xfrm>
             <a:off x="3657600" y="1463040"/>
-            <a:ext cx="2560320" cy="914400"/>
+            <a:ext cx="2560320" cy="584775"/>
           </a:xfrm>
           <a:prstGeom prst="rect">
             <a:avLst/>
@@ -8808,7 +8339,7 @@
         <p:spPr>
           <a:xfrm>
             <a:off x="6400800" y="1463040"/>
-            <a:ext cx="2560320" cy="914400"/>
+            <a:ext cx="2560320" cy="584775"/>
           </a:xfrm>
           <a:prstGeom prst="rect">
             <a:avLst/>
@@ -8862,7 +8393,7 @@
         </p:nvSpPr>
         <p:spPr>
           <a:xfrm>
-            <a:off x="3657600" y="2651760"/>
+            <a:off x="3657600" y="2286000"/>
             <a:ext cx="5303520" cy="457200"/>
           </a:xfrm>
           <a:prstGeom prst="rect">
@@ -8885,6 +8416,7 @@
               </a:defRPr>
             </a:pPr>
             <a:r>
+              <a:rPr dirty="0"/>
               <a:t>744 hours of nonstop coverage · 86% auto-routed via playbooks</a:t>
             </a:r>
           </a:p>
@@ -8928,7 +8460,7 @@
           </a:fontRef>
         </p:style>
         <p:txBody>
-          <a:bodyPr rtlCol="0" anchor="ctr" lIns="182880" rIns="182880" tIns="137160" bIns="137160"/>
+          <a:bodyPr lIns="182880" tIns="137160" rIns="182880" bIns="137160" rtlCol="0" anchor="ctr"/>
           <a:lstStyle/>
           <a:p>
             <a:pPr algn="l">
@@ -8940,6 +8472,7 @@
               </a:defRPr>
             </a:pPr>
             <a:r>
+              <a:rPr sz="1400" dirty="0"/>
               <a:t>What This Means for Your Organization</a:t>
             </a:r>
           </a:p>
@@ -8953,6 +8486,7 @@
               </a:defRPr>
             </a:pPr>
             <a:r>
+              <a:rPr sz="1200" dirty="0"/>
               <a:t>Your team received continuous protection outside business hours. 158 incidents were detected and escalated while your team was off-duty, with 86% automatically routed through playbooks—minimizing manual intervention and ensuring no threats went unaddressed.</a:t>
             </a:r>
           </a:p>
@@ -8967,7 +8501,7 @@
 </file>
 
 <file path=ppt/slides/slide17.xml><?xml version="1.0" encoding="utf-8"?>
-<p:sld xmlns:a="http://schemas.openxmlformats.org/drawingml/2006/main" xmlns:p="http://schemas.openxmlformats.org/presentationml/2006/main" xmlns:r="http://schemas.openxmlformats.org/officeDocument/2006/relationships">
+<p:sld xmlns:a="http://schemas.openxmlformats.org/drawingml/2006/main" xmlns:r="http://schemas.openxmlformats.org/officeDocument/2006/relationships" xmlns:p="http://schemas.openxmlformats.org/presentationml/2006/main">
   <p:cSld>
     <p:spTree>
       <p:nvGrpSpPr>
@@ -8975,7 +8509,14 @@
         <p:cNvGrpSpPr/>
         <p:nvPr/>
       </p:nvGrpSpPr>
-      <p:grpSpPr/>
+      <p:grpSpPr>
+        <a:xfrm>
+          <a:off x="0" y="0"/>
+          <a:ext cx="0" cy="0"/>
+          <a:chOff x="0" y="0"/>
+          <a:chExt cx="0" cy="0"/>
+        </a:xfrm>
+      </p:grpSpPr>
       <p:sp>
         <p:nvSpPr>
           <p:cNvPr id="2" name="TextBox 1"/>
@@ -9201,7 +8742,7 @@
         <p:spPr>
           <a:xfrm>
             <a:off x="457200" y="640080"/>
-            <a:ext cx="7315200" cy="640080"/>
+            <a:ext cx="7315200" cy="707886"/>
           </a:xfrm>
           <a:prstGeom prst="rect">
             <a:avLst/>
@@ -9223,6 +8764,7 @@
               </a:defRPr>
             </a:pPr>
             <a:r>
+              <a:rPr sz="4000" dirty="0"/>
               <a:t>Response Efficiency</a:t>
             </a:r>
           </a:p>
@@ -9270,6 +8812,7 @@
           <a:lstStyle/>
           <a:p>
             <a:pPr algn="ctr"/>
+            <a:endParaRPr/>
           </a:p>
         </p:txBody>
       </p:sp>
@@ -9423,6 +8966,7 @@
           <a:lstStyle/>
           <a:p>
             <a:pPr algn="ctr"/>
+            <a:endParaRPr/>
           </a:p>
         </p:txBody>
       </p:sp>
@@ -9576,6 +9120,7 @@
           <a:lstStyle/>
           <a:p>
             <a:pPr algn="ctr"/>
+            <a:endParaRPr/>
           </a:p>
         </p:txBody>
       </p:sp>
@@ -9729,6 +9274,7 @@
           <a:lstStyle/>
           <a:p>
             <a:pPr algn="ctr"/>
+            <a:endParaRPr/>
           </a:p>
         </p:txBody>
       </p:sp>
@@ -9849,7 +9395,7 @@
         <p:spPr>
           <a:xfrm>
             <a:off x="457200" y="3291840"/>
-            <a:ext cx="8229600" cy="914400"/>
+            <a:ext cx="8229600" cy="707886"/>
           </a:xfrm>
           <a:prstGeom prst="rect">
             <a:avLst/>
@@ -9878,7 +9424,7 @@
           </a:fontRef>
         </p:style>
         <p:txBody>
-          <a:bodyPr rtlCol="0" anchor="ctr" lIns="274320" rIns="274320" tIns="137160" bIns="137160"/>
+          <a:bodyPr lIns="274320" tIns="137160" rIns="274320" bIns="137160" rtlCol="0" anchor="ctr"/>
           <a:lstStyle/>
           <a:p>
             <a:pPr algn="l">
@@ -9890,6 +9436,7 @@
               </a:defRPr>
             </a:pPr>
             <a:r>
+              <a:rPr sz="2000" dirty="0"/>
               <a:t>P90 Response Time: 87 minutes</a:t>
             </a:r>
           </a:p>
@@ -9903,6 +9450,7 @@
               </a:defRPr>
             </a:pPr>
             <a:r>
+              <a:rPr sz="1200" dirty="0"/>
               <a:t>90% of incidents responded to within 87 minutes—34% faster than industry median (192m)</a:t>
             </a:r>
           </a:p>
@@ -9916,8 +9464,8 @@
         </p:nvSpPr>
         <p:spPr>
           <a:xfrm>
-            <a:off x="457200" y="4480560"/>
-            <a:ext cx="8229600" cy="731520"/>
+            <a:off x="457200" y="4137660"/>
+            <a:ext cx="8229600" cy="457974"/>
           </a:xfrm>
           <a:prstGeom prst="rect">
             <a:avLst/>
@@ -9946,7 +9494,7 @@
           </a:fontRef>
         </p:style>
         <p:txBody>
-          <a:bodyPr rtlCol="0" anchor="t" lIns="182880" rIns="182880"/>
+          <a:bodyPr lIns="182880" rIns="182880" rtlCol="0" anchor="t"/>
           <a:lstStyle/>
           <a:p>
             <a:pPr algn="l">
@@ -9958,6 +9506,7 @@
               </a:defRPr>
             </a:pPr>
             <a:r>
+              <a:rPr sz="1200" dirty="0"/>
               <a:t>What This Means: Faster response times mean threats are contained before they can spread. Your 34% advantage translates to reduced risk exposure and better business continuity.</a:t>
             </a:r>
           </a:p>
@@ -9972,7 +9521,7 @@
 </file>
 
 <file path=ppt/slides/slide18.xml><?xml version="1.0" encoding="utf-8"?>
-<p:sld xmlns:a="http://schemas.openxmlformats.org/drawingml/2006/main" xmlns:p="http://schemas.openxmlformats.org/presentationml/2006/main" xmlns:r="http://schemas.openxmlformats.org/officeDocument/2006/relationships">
+<p:sld xmlns:a="http://schemas.openxmlformats.org/drawingml/2006/main" xmlns:r="http://schemas.openxmlformats.org/officeDocument/2006/relationships" xmlns:p="http://schemas.openxmlformats.org/presentationml/2006/main">
   <p:cSld>
     <p:spTree>
       <p:nvGrpSpPr>
@@ -9980,7 +9529,14 @@
         <p:cNvGrpSpPr/>
         <p:nvPr/>
       </p:nvGrpSpPr>
-      <p:grpSpPr/>
+      <p:grpSpPr>
+        <a:xfrm>
+          <a:off x="0" y="0"/>
+          <a:ext cx="0" cy="0"/>
+          <a:chOff x="0" y="0"/>
+          <a:chExt cx="0" cy="0"/>
+        </a:xfrm>
+      </p:grpSpPr>
       <p:sp>
         <p:nvSpPr>
           <p:cNvPr id="2" name="TextBox 1"/>
@@ -10275,6 +9831,7 @@
           <a:lstStyle/>
           <a:p>
             <a:pPr algn="ctr"/>
+            <a:endParaRPr/>
           </a:p>
         </p:txBody>
       </p:sp>
@@ -10428,6 +9985,7 @@
           <a:lstStyle/>
           <a:p>
             <a:pPr algn="ctr"/>
+            <a:endParaRPr/>
           </a:p>
         </p:txBody>
       </p:sp>
@@ -10581,6 +10139,7 @@
           <a:lstStyle/>
           <a:p>
             <a:pPr algn="ctr"/>
+            <a:endParaRPr/>
           </a:p>
         </p:txBody>
       </p:sp>
@@ -10701,7 +10260,7 @@
         <p:spPr>
           <a:xfrm>
             <a:off x="457200" y="3657600"/>
-            <a:ext cx="8229600" cy="1097280"/>
+            <a:ext cx="8229600" cy="640080"/>
           </a:xfrm>
           <a:prstGeom prst="rect">
             <a:avLst/>
@@ -10730,7 +10289,7 @@
           </a:fontRef>
         </p:style>
         <p:txBody>
-          <a:bodyPr rtlCol="0" anchor="ctr" lIns="182880" rIns="182880" tIns="137160" bIns="137160"/>
+          <a:bodyPr lIns="182880" tIns="137160" rIns="182880" bIns="137160" rtlCol="0" anchor="ctr"/>
           <a:lstStyle/>
           <a:p>
             <a:pPr algn="l">
@@ -10742,6 +10301,7 @@
               </a:defRPr>
             </a:pPr>
             <a:r>
+              <a:rPr sz="1400" dirty="0"/>
               <a:t>What This Means for Your Organization</a:t>
             </a:r>
           </a:p>
@@ -10755,6 +10315,7 @@
               </a:defRPr>
             </a:pPr>
             <a:r>
+              <a:rPr sz="1200" dirty="0"/>
               <a:t>Effective collaboration means faster threat resolution. With 72% client participation and 21% client-led closures, your team is actively engaged in the security process while Critical Start handles the heavy lifting.</a:t>
             </a:r>
           </a:p>
@@ -10769,7 +10330,7 @@
 </file>
 
 <file path=ppt/slides/slide19.xml><?xml version="1.0" encoding="utf-8"?>
-<p:sld xmlns:a="http://schemas.openxmlformats.org/drawingml/2006/main" xmlns:p="http://schemas.openxmlformats.org/presentationml/2006/main" xmlns:r="http://schemas.openxmlformats.org/officeDocument/2006/relationships">
+<p:sld xmlns:a="http://schemas.openxmlformats.org/drawingml/2006/main" xmlns:r="http://schemas.openxmlformats.org/officeDocument/2006/relationships" xmlns:p="http://schemas.openxmlformats.org/presentationml/2006/main">
   <p:cSld>
     <p:spTree>
       <p:nvGrpSpPr>
@@ -10777,7 +10338,14 @@
         <p:cNvGrpSpPr/>
         <p:nvPr/>
       </p:nvGrpSpPr>
-      <p:grpSpPr/>
+      <p:grpSpPr>
+        <a:xfrm>
+          <a:off x="0" y="0"/>
+          <a:ext cx="0" cy="0"/>
+          <a:chOff x="0" y="0"/>
+          <a:chExt cx="0" cy="0"/>
+        </a:xfrm>
+      </p:grpSpPr>
       <p:sp>
         <p:nvSpPr>
           <p:cNvPr id="2" name="TextBox 1"/>
@@ -11072,6 +10640,7 @@
           <a:lstStyle/>
           <a:p>
             <a:pPr algn="ctr"/>
+            <a:endParaRPr/>
           </a:p>
         </p:txBody>
       </p:sp>
@@ -11225,6 +10794,7 @@
           <a:lstStyle/>
           <a:p>
             <a:pPr algn="ctr"/>
+            <a:endParaRPr/>
           </a:p>
         </p:txBody>
       </p:sp>
@@ -11378,6 +10948,7 @@
           <a:lstStyle/>
           <a:p>
             <a:pPr algn="ctr"/>
+            <a:endParaRPr/>
           </a:p>
         </p:txBody>
       </p:sp>
@@ -11498,7 +11069,7 @@
         <p:spPr>
           <a:xfrm>
             <a:off x="457200" y="3383280"/>
-            <a:ext cx="8229600" cy="731520"/>
+            <a:ext cx="8229600" cy="457200"/>
           </a:xfrm>
           <a:prstGeom prst="rect">
             <a:avLst/>
@@ -11527,7 +11098,7 @@
           </a:fontRef>
         </p:style>
         <p:txBody>
-          <a:bodyPr rtlCol="0" anchor="t" lIns="274320" rIns="274320"/>
+          <a:bodyPr lIns="274320" rIns="274320" rtlCol="0" anchor="t"/>
           <a:lstStyle/>
           <a:p>
             <a:pPr algn="ctr">
@@ -11539,6 +11110,7 @@
               </a:defRPr>
             </a:pPr>
             <a:r>
+              <a:rPr dirty="0"/>
               <a:t>False Positive Rate: 9.0% ✓ Within target</a:t>
             </a:r>
           </a:p>
@@ -11552,8 +11124,8 @@
         </p:nvSpPr>
         <p:spPr>
           <a:xfrm>
-            <a:off x="457200" y="4389120"/>
-            <a:ext cx="8229600" cy="822960"/>
+            <a:off x="457200" y="4011930"/>
+            <a:ext cx="8229600" cy="548640"/>
           </a:xfrm>
           <a:prstGeom prst="rect">
             <a:avLst/>
@@ -11582,7 +11154,7 @@
           </a:fontRef>
         </p:style>
         <p:txBody>
-          <a:bodyPr rtlCol="0" anchor="t" lIns="182880" rIns="182880"/>
+          <a:bodyPr lIns="182880" rIns="182880" rtlCol="0" anchor="t"/>
           <a:lstStyle/>
           <a:p>
             <a:pPr algn="l">
@@ -11594,6 +11166,7 @@
               </a:defRPr>
             </a:pPr>
             <a:r>
+              <a:rPr sz="1200" dirty="0"/>
               <a:t>What This Means: High detection quality means less noise for your team. With 91% signal fidelity, Critical Start filters out the false alarms so your analysts focus only on real threats.</a:t>
             </a:r>
           </a:p>
@@ -11608,7 +11181,7 @@
 </file>
 
 <file path=ppt/slides/slide2.xml><?xml version="1.0" encoding="utf-8"?>
-<p:sld xmlns:a="http://schemas.openxmlformats.org/drawingml/2006/main" xmlns:p="http://schemas.openxmlformats.org/presentationml/2006/main" xmlns:r="http://schemas.openxmlformats.org/officeDocument/2006/relationships">
+<p:sld xmlns:a="http://schemas.openxmlformats.org/drawingml/2006/main" xmlns:r="http://schemas.openxmlformats.org/officeDocument/2006/relationships" xmlns:p="http://schemas.openxmlformats.org/presentationml/2006/main">
   <p:cSld>
     <p:spTree>
       <p:nvGrpSpPr>
@@ -11616,7 +11189,14 @@
         <p:cNvGrpSpPr/>
         <p:nvPr/>
       </p:nvGrpSpPr>
-      <p:grpSpPr/>
+      <p:grpSpPr>
+        <a:xfrm>
+          <a:off x="0" y="0"/>
+          <a:ext cx="0" cy="0"/>
+          <a:chOff x="0" y="0"/>
+          <a:chExt cx="0" cy="0"/>
+        </a:xfrm>
+      </p:grpSpPr>
       <p:sp>
         <p:nvSpPr>
           <p:cNvPr id="2" name="TextBox 1"/>
@@ -11842,7 +11422,7 @@
         <p:spPr>
           <a:xfrm>
             <a:off x="457200" y="640080"/>
-            <a:ext cx="7315200" cy="731520"/>
+            <a:ext cx="7315200" cy="707886"/>
           </a:xfrm>
           <a:prstGeom prst="rect">
             <a:avLst/>
@@ -11864,6 +11444,7 @@
               </a:defRPr>
             </a:pPr>
             <a:r>
+              <a:rPr sz="4000" dirty="0"/>
               <a:t>Executive Summary</a:t>
             </a:r>
           </a:p>
@@ -11878,7 +11459,7 @@
         <p:spPr>
           <a:xfrm>
             <a:off x="914400" y="1463040"/>
-            <a:ext cx="7315200" cy="1097280"/>
+            <a:ext cx="7315200" cy="584775"/>
           </a:xfrm>
           <a:prstGeom prst="rect">
             <a:avLst/>
@@ -11900,6 +11481,7 @@
               </a:defRPr>
             </a:pPr>
             <a:r>
+              <a:rPr sz="3200" dirty="0"/>
               <a:t>267 Incidents Escalated</a:t>
             </a:r>
           </a:p>
@@ -11986,7 +11568,7 @@
 </file>
 
 <file path=ppt/slides/slide20.xml><?xml version="1.0" encoding="utf-8"?>
-<p:sld xmlns:a="http://schemas.openxmlformats.org/drawingml/2006/main" xmlns:p="http://schemas.openxmlformats.org/presentationml/2006/main" xmlns:r="http://schemas.openxmlformats.org/officeDocument/2006/relationships">
+<p:sld xmlns:a="http://schemas.openxmlformats.org/drawingml/2006/main" xmlns:r="http://schemas.openxmlformats.org/officeDocument/2006/relationships" xmlns:p="http://schemas.openxmlformats.org/presentationml/2006/main">
   <p:cSld>
     <p:spTree>
       <p:nvGrpSpPr>
@@ -11994,7 +11576,14 @@
         <p:cNvGrpSpPr/>
         <p:nvPr/>
       </p:nvGrpSpPr>
-      <p:grpSpPr/>
+      <p:grpSpPr>
+        <a:xfrm>
+          <a:off x="0" y="0"/>
+          <a:ext cx="0" cy="0"/>
+          <a:chOff x="0" y="0"/>
+          <a:chExt cx="0" cy="0"/>
+        </a:xfrm>
+      </p:grpSpPr>
       <p:sp>
         <p:nvSpPr>
           <p:cNvPr id="2" name="TextBox 1"/>
@@ -12220,7 +11809,7 @@
         <p:spPr>
           <a:xfrm>
             <a:off x="457200" y="640080"/>
-            <a:ext cx="7315200" cy="640080"/>
+            <a:ext cx="7315200" cy="646331"/>
           </a:xfrm>
           <a:prstGeom prst="rect">
             <a:avLst/>
@@ -12242,6 +11831,7 @@
               </a:defRPr>
             </a:pPr>
             <a:r>
+              <a:rPr sz="3600" dirty="0"/>
               <a:t>Security Outcomes This Period</a:t>
             </a:r>
           </a:p>
@@ -12289,6 +11879,7 @@
           <a:lstStyle/>
           <a:p>
             <a:pPr algn="ctr"/>
+            <a:endParaRPr/>
           </a:p>
         </p:txBody>
       </p:sp>
@@ -12323,6 +11914,7 @@
               </a:defRPr>
             </a:pPr>
             <a:r>
+              <a:rPr dirty="0"/>
               <a:t>2,110</a:t>
             </a:r>
           </a:p>
@@ -12395,6 +11987,7 @@
               </a:defRPr>
             </a:pPr>
             <a:r>
+              <a:rPr dirty="0"/>
               <a:t>1,690 guided · 420 closed end-to-end</a:t>
             </a:r>
           </a:p>
@@ -12442,6 +12035,7 @@
           <a:lstStyle/>
           <a:p>
             <a:pPr algn="ctr"/>
+            <a:endParaRPr/>
           </a:p>
         </p:txBody>
       </p:sp>
@@ -12595,6 +12189,7 @@
           <a:lstStyle/>
           <a:p>
             <a:pPr algn="ctr"/>
+            <a:endParaRPr/>
           </a:p>
         </p:txBody>
       </p:sp>
@@ -12748,6 +12343,7 @@
           <a:lstStyle/>
           <a:p>
             <a:pPr algn="ctr"/>
+            <a:endParaRPr/>
           </a:p>
         </p:txBody>
       </p:sp>
@@ -12868,7 +12464,7 @@
 </file>
 
 <file path=ppt/slides/slide21.xml><?xml version="1.0" encoding="utf-8"?>
-<p:sld xmlns:a="http://schemas.openxmlformats.org/drawingml/2006/main" xmlns:p="http://schemas.openxmlformats.org/presentationml/2006/main" xmlns:r="http://schemas.openxmlformats.org/officeDocument/2006/relationships">
+<p:sld xmlns:a="http://schemas.openxmlformats.org/drawingml/2006/main" xmlns:r="http://schemas.openxmlformats.org/officeDocument/2006/relationships" xmlns:p="http://schemas.openxmlformats.org/presentationml/2006/main">
   <p:cSld>
     <p:spTree>
       <p:nvGrpSpPr>
@@ -12876,7 +12472,14 @@
         <p:cNvGrpSpPr/>
         <p:nvPr/>
       </p:nvGrpSpPr>
-      <p:grpSpPr/>
+      <p:grpSpPr>
+        <a:xfrm>
+          <a:off x="0" y="0"/>
+          <a:ext cx="0" cy="0"/>
+          <a:chOff x="0" y="0"/>
+          <a:chExt cx="0" cy="0"/>
+        </a:xfrm>
+      </p:grpSpPr>
       <p:sp>
         <p:nvSpPr>
           <p:cNvPr id="2" name="TextBox 1"/>
@@ -12993,7 +12596,7 @@
         </p:nvSpPr>
         <p:spPr>
           <a:xfrm>
-            <a:off x="457200" y="4732020"/>
+            <a:off x="457200" y="4396943"/>
             <a:ext cx="2743200" cy="320040"/>
           </a:xfrm>
           <a:prstGeom prst="rect">
@@ -13029,7 +12632,7 @@
         </p:nvSpPr>
         <p:spPr>
           <a:xfrm>
-            <a:off x="3200400" y="4732020"/>
+            <a:off x="3200400" y="4396943"/>
             <a:ext cx="2743200" cy="320040"/>
           </a:xfrm>
           <a:prstGeom prst="rect">
@@ -13065,7 +12668,7 @@
         </p:nvSpPr>
         <p:spPr>
           <a:xfrm>
-            <a:off x="5943600" y="4732020"/>
+            <a:off x="5943600" y="4396943"/>
             <a:ext cx="2743200" cy="320040"/>
           </a:xfrm>
           <a:prstGeom prst="rect">
@@ -13102,7 +12705,7 @@
         <p:spPr>
           <a:xfrm>
             <a:off x="457200" y="640080"/>
-            <a:ext cx="7315200" cy="640080"/>
+            <a:ext cx="7315200" cy="646331"/>
           </a:xfrm>
           <a:prstGeom prst="rect">
             <a:avLst/>
@@ -13124,6 +12727,7 @@
               </a:defRPr>
             </a:pPr>
             <a:r>
+              <a:rPr sz="3600" dirty="0"/>
               <a:t>Key Takeaways: This Period</a:t>
             </a:r>
           </a:p>
@@ -13138,7 +12742,7 @@
         <p:spPr>
           <a:xfrm>
             <a:off x="457200" y="1463040"/>
-            <a:ext cx="8229600" cy="822960"/>
+            <a:ext cx="8229600" cy="564455"/>
           </a:xfrm>
           <a:prstGeom prst="rect">
             <a:avLst/>
@@ -13171,6 +12775,7 @@
           <a:lstStyle/>
           <a:p>
             <a:pPr algn="ctr"/>
+            <a:endParaRPr/>
           </a:p>
         </p:txBody>
       </p:sp>
@@ -13182,7 +12787,7 @@
         </p:nvSpPr>
         <p:spPr>
           <a:xfrm>
-            <a:off x="594360" y="1691640"/>
+            <a:off x="594360" y="1485492"/>
             <a:ext cx="457200" cy="457200"/>
           </a:xfrm>
           <a:prstGeom prst="rect">
@@ -13205,6 +12810,7 @@
               </a:defRPr>
             </a:pPr>
             <a:r>
+              <a:rPr dirty="0"/>
               <a:t>✓</a:t>
             </a:r>
           </a:p>
@@ -13218,8 +12824,8 @@
         </p:nvSpPr>
         <p:spPr>
           <a:xfrm>
-            <a:off x="1097280" y="1645920"/>
-            <a:ext cx="7406640" cy="548640"/>
+            <a:off x="1097280" y="1561795"/>
+            <a:ext cx="7406640" cy="307777"/>
           </a:xfrm>
           <a:prstGeom prst="rect">
             <a:avLst/>
@@ -13241,6 +12847,7 @@
               </a:defRPr>
             </a:pPr>
             <a:r>
+              <a:rPr sz="1400" dirty="0"/>
               <a:t>34% faster response than industry peers—threats are contained before spreading</a:t>
             </a:r>
           </a:p>
@@ -13254,8 +12861,8 @@
         </p:nvSpPr>
         <p:spPr>
           <a:xfrm>
-            <a:off x="457200" y="2423160"/>
-            <a:ext cx="8229600" cy="822960"/>
+            <a:off x="457200" y="2130063"/>
+            <a:ext cx="8229600" cy="564455"/>
           </a:xfrm>
           <a:prstGeom prst="rect">
             <a:avLst/>
@@ -13288,6 +12895,7 @@
           <a:lstStyle/>
           <a:p>
             <a:pPr algn="ctr"/>
+            <a:endParaRPr/>
           </a:p>
         </p:txBody>
       </p:sp>
@@ -13299,7 +12907,7 @@
         </p:nvSpPr>
         <p:spPr>
           <a:xfrm>
-            <a:off x="594360" y="2651760"/>
+            <a:off x="594360" y="2161367"/>
             <a:ext cx="457200" cy="457200"/>
           </a:xfrm>
           <a:prstGeom prst="rect">
@@ -13322,6 +12930,7 @@
               </a:defRPr>
             </a:pPr>
             <a:r>
+              <a:rPr dirty="0"/>
               <a:t>✓</a:t>
             </a:r>
           </a:p>
@@ -13335,8 +12944,8 @@
         </p:nvSpPr>
         <p:spPr>
           <a:xfrm>
-            <a:off x="1097280" y="2606040"/>
-            <a:ext cx="7406640" cy="548640"/>
+            <a:off x="1097280" y="2233235"/>
+            <a:ext cx="7406640" cy="307777"/>
           </a:xfrm>
           <a:prstGeom prst="rect">
             <a:avLst/>
@@ -13358,6 +12967,7 @@
               </a:defRPr>
             </a:pPr>
             <a:r>
+              <a:rPr sz="1400" dirty="0"/>
               <a:t>100% threat containment with zero breaches this period across 11 true positive incidents</a:t>
             </a:r>
           </a:p>
@@ -13371,8 +12981,8 @@
         </p:nvSpPr>
         <p:spPr>
           <a:xfrm>
-            <a:off x="457200" y="3383280"/>
-            <a:ext cx="8229600" cy="822960"/>
+            <a:off x="457200" y="2797424"/>
+            <a:ext cx="8229600" cy="564455"/>
           </a:xfrm>
           <a:prstGeom prst="rect">
             <a:avLst/>
@@ -13405,6 +13015,7 @@
           <a:lstStyle/>
           <a:p>
             <a:pPr algn="ctr"/>
+            <a:endParaRPr/>
           </a:p>
         </p:txBody>
       </p:sp>
@@ -13416,7 +13027,7 @@
         </p:nvSpPr>
         <p:spPr>
           <a:xfrm>
-            <a:off x="594360" y="3611880"/>
+            <a:off x="594360" y="2825546"/>
             <a:ext cx="457200" cy="457200"/>
           </a:xfrm>
           <a:prstGeom prst="rect">
@@ -13439,6 +13050,7 @@
               </a:defRPr>
             </a:pPr>
             <a:r>
+              <a:rPr dirty="0"/>
               <a:t>✓</a:t>
             </a:r>
           </a:p>
@@ -13452,8 +13064,8 @@
         </p:nvSpPr>
         <p:spPr>
           <a:xfrm>
-            <a:off x="1097280" y="3566160"/>
-            <a:ext cx="7406640" cy="548640"/>
+            <a:off x="1097280" y="2900258"/>
+            <a:ext cx="7406640" cy="307777"/>
           </a:xfrm>
           <a:prstGeom prst="rect">
             <a:avLst/>
@@ -13475,6 +13087,7 @@
               </a:defRPr>
             </a:pPr>
             <a:r>
+              <a:rPr sz="1400" dirty="0"/>
               <a:t>$7.55M in modeled cost exposure avoided through proactive security operations</a:t>
             </a:r>
           </a:p>
@@ -13488,8 +13101,8 @@
         </p:nvSpPr>
         <p:spPr>
           <a:xfrm>
-            <a:off x="457200" y="4343400"/>
-            <a:ext cx="8229600" cy="822960"/>
+            <a:off x="457200" y="3464713"/>
+            <a:ext cx="8229600" cy="564455"/>
           </a:xfrm>
           <a:prstGeom prst="rect">
             <a:avLst/>
@@ -13522,6 +13135,7 @@
           <a:lstStyle/>
           <a:p>
             <a:pPr algn="ctr"/>
+            <a:endParaRPr/>
           </a:p>
         </p:txBody>
       </p:sp>
@@ -13533,7 +13147,7 @@
         </p:nvSpPr>
         <p:spPr>
           <a:xfrm>
-            <a:off x="594360" y="4572000"/>
+            <a:off x="594360" y="3439213"/>
             <a:ext cx="457200" cy="457200"/>
           </a:xfrm>
           <a:prstGeom prst="rect">
@@ -13556,6 +13170,7 @@
               </a:defRPr>
             </a:pPr>
             <a:r>
+              <a:rPr dirty="0"/>
               <a:t>✓</a:t>
             </a:r>
           </a:p>
@@ -13569,8 +13184,8 @@
         </p:nvSpPr>
         <p:spPr>
           <a:xfrm>
-            <a:off x="1097280" y="4526280"/>
-            <a:ext cx="7406640" cy="548640"/>
+            <a:off x="1097280" y="3490830"/>
+            <a:ext cx="7406640" cy="307777"/>
           </a:xfrm>
           <a:prstGeom prst="rect">
             <a:avLst/>
@@ -13592,6 +13207,7 @@
               </a:defRPr>
             </a:pPr>
             <a:r>
+              <a:rPr sz="1400" dirty="0"/>
               <a:t>158 after-hours escalations handled seamlessly with 86% automation</a:t>
             </a:r>
           </a:p>
@@ -13606,7 +13222,7 @@
 </file>
 
 <file path=ppt/slides/slide22.xml><?xml version="1.0" encoding="utf-8"?>
-<p:sld xmlns:a="http://schemas.openxmlformats.org/drawingml/2006/main" xmlns:p="http://schemas.openxmlformats.org/presentationml/2006/main" xmlns:r="http://schemas.openxmlformats.org/officeDocument/2006/relationships">
+<p:sld xmlns:a="http://schemas.openxmlformats.org/drawingml/2006/main" xmlns:r="http://schemas.openxmlformats.org/officeDocument/2006/relationships" xmlns:p="http://schemas.openxmlformats.org/presentationml/2006/main">
   <p:cSld>
     <p:spTree>
       <p:nvGrpSpPr>
@@ -13614,7 +13230,14 @@
         <p:cNvGrpSpPr/>
         <p:nvPr/>
       </p:nvGrpSpPr>
-      <p:grpSpPr/>
+      <p:grpSpPr>
+        <a:xfrm>
+          <a:off x="0" y="0"/>
+          <a:ext cx="0" cy="0"/>
+          <a:chOff x="0" y="0"/>
+          <a:chExt cx="0" cy="0"/>
+        </a:xfrm>
+      </p:grpSpPr>
       <p:sp>
         <p:nvSpPr>
           <p:cNvPr id="2" name="TextBox 1"/>
@@ -13840,7 +13463,7 @@
         <p:spPr>
           <a:xfrm>
             <a:off x="457200" y="640080"/>
-            <a:ext cx="7315200" cy="640080"/>
+            <a:ext cx="7315200" cy="707886"/>
           </a:xfrm>
           <a:prstGeom prst="rect">
             <a:avLst/>
@@ -13862,6 +13485,7 @@
               </a:defRPr>
             </a:pPr>
             <a:r>
+              <a:rPr sz="4000" dirty="0"/>
               <a:t>Looking Ahead</a:t>
             </a:r>
           </a:p>
@@ -13898,6 +13522,7 @@
               </a:defRPr>
             </a:pPr>
             <a:r>
+              <a:rPr dirty="0"/>
               <a:t>Next Period Targets</a:t>
             </a:r>
           </a:p>
@@ -13912,15 +13537,15 @@
         <p:spPr>
           <a:xfrm>
             <a:off x="731520" y="1920240"/>
-            <a:ext cx="7955280" cy="640080"/>
-          </a:xfrm>
-          <a:prstGeom prst="rect">
-            <a:avLst/>
-          </a:prstGeom>
-          <a:noFill/>
-        </p:spPr>
-        <p:txBody>
-          <a:bodyPr wrap="square" lIns="182880" rIns="182880" tIns="91440" bIns="91440">
+            <a:ext cx="7955280" cy="656590"/>
+          </a:xfrm>
+          <a:prstGeom prst="rect">
+            <a:avLst/>
+          </a:prstGeom>
+          <a:noFill/>
+        </p:spPr>
+        <p:txBody>
+          <a:bodyPr wrap="square" lIns="182880" tIns="91440" rIns="182880" bIns="91440">
             <a:spAutoFit/>
           </a:bodyPr>
           <a:lstStyle/>
@@ -13937,6 +13562,7 @@
               </a:defRPr>
             </a:pPr>
             <a:r>
+              <a:rPr sz="1200" dirty="0"/>
               <a:t>✓ Trim Palo Alto XDR false positives from 11.2% to 10% threshold (~4 fewer escalations)</a:t>
             </a:r>
           </a:p>
@@ -13953,6 +13579,7 @@
               </a:defRPr>
             </a:pPr>
             <a:r>
+              <a:rPr sz="1200" dirty="0"/>
               <a:t>✓ Reduce manual escalations from 38 (14%) to 32 or fewer (12% target)</a:t>
             </a:r>
           </a:p>
@@ -13966,7 +13593,7 @@
         </p:nvSpPr>
         <p:spPr>
           <a:xfrm>
-            <a:off x="457200" y="2834640"/>
+            <a:off x="457200" y="2668270"/>
             <a:ext cx="8229600" cy="365760"/>
           </a:xfrm>
           <a:prstGeom prst="rect">
@@ -14002,16 +13629,16 @@
         </p:nvSpPr>
         <p:spPr>
           <a:xfrm>
-            <a:off x="731520" y="3291840"/>
-            <a:ext cx="7955280" cy="457200"/>
-          </a:xfrm>
-          <a:prstGeom prst="rect">
-            <a:avLst/>
-          </a:prstGeom>
-          <a:noFill/>
-        </p:spPr>
-        <p:txBody>
-          <a:bodyPr wrap="square" lIns="182880" rIns="182880" tIns="91440" bIns="91440">
+            <a:off x="731520" y="3125470"/>
+            <a:ext cx="7955280" cy="656590"/>
+          </a:xfrm>
+          <a:prstGeom prst="rect">
+            <a:avLst/>
+          </a:prstGeom>
+          <a:noFill/>
+        </p:spPr>
+        <p:txBody>
+          <a:bodyPr wrap="square" lIns="182880" tIns="91440" rIns="182880" bIns="91440">
             <a:spAutoFit/>
           </a:bodyPr>
           <a:lstStyle/>
@@ -14028,6 +13655,7 @@
               </a:defRPr>
             </a:pPr>
             <a:r>
+              <a:rPr sz="1200" dirty="0"/>
               <a:t>✓ Proactive hunts targeting Persistence and Defense Evasion tactics</a:t>
             </a:r>
           </a:p>
@@ -14044,6 +13672,7 @@
               </a:defRPr>
             </a:pPr>
             <a:r>
+              <a:rPr sz="1200" dirty="0"/>
               <a:t>✓ Additional playbook coverage for analyst-escalated scenarios</a:t>
             </a:r>
           </a:p>
@@ -14057,7 +13686,7 @@
         </p:nvSpPr>
         <p:spPr>
           <a:xfrm>
-            <a:off x="457200" y="4023360"/>
+            <a:off x="457200" y="3873500"/>
             <a:ext cx="8229600" cy="365760"/>
           </a:xfrm>
           <a:prstGeom prst="rect">
@@ -14080,6 +13709,7 @@
               </a:defRPr>
             </a:pPr>
             <a:r>
+              <a:rPr dirty="0"/>
               <a:t>Your Partnership</a:t>
             </a:r>
           </a:p>
@@ -14093,7 +13723,7 @@
         </p:nvSpPr>
         <p:spPr>
           <a:xfrm>
-            <a:off x="457200" y="4480560"/>
+            <a:off x="457200" y="4284980"/>
             <a:ext cx="8229600" cy="274320"/>
           </a:xfrm>
           <a:prstGeom prst="rect">
@@ -14116,43 +13746,8 @@
               </a:defRPr>
             </a:pPr>
             <a:r>
+              <a:rPr dirty="0"/>
               <a:t>Questions? Your Customer Success Manager is here to help.</a:t>
-            </a:r>
-          </a:p>
-        </p:txBody>
-      </p:sp>
-      <p:sp>
-        <p:nvSpPr>
-          <p:cNvPr id="15" name="TextBox 14"/>
-          <p:cNvSpPr txBox="1"/>
-          <p:nvPr/>
-        </p:nvSpPr>
-        <p:spPr>
-          <a:xfrm>
-            <a:off x="457200" y="4686300"/>
-            <a:ext cx="8229600" cy="274320"/>
-          </a:xfrm>
-          <a:prstGeom prst="rect">
-            <a:avLst/>
-          </a:prstGeom>
-          <a:noFill/>
-        </p:spPr>
-        <p:txBody>
-          <a:bodyPr wrap="square">
-            <a:spAutoFit/>
-          </a:bodyPr>
-          <a:lstStyle/>
-          <a:p>
-            <a:pPr algn="l">
-              <a:defRPr sz="1000" i="1">
-                <a:solidFill>
-                  <a:srgbClr val="343741"/>
-                </a:solidFill>
-                <a:latin typeface="Roboto"/>
-              </a:defRPr>
-            </a:pPr>
-            <a:r>
-              <a:t>Report generated: November 5, 2025 | Data sources: Escalation Details Report</a:t>
             </a:r>
           </a:p>
         </p:txBody>
@@ -14166,7 +13761,7 @@
 </file>
 
 <file path=ppt/slides/slide3.xml><?xml version="1.0" encoding="utf-8"?>
-<p:sld xmlns:a="http://schemas.openxmlformats.org/drawingml/2006/main" xmlns:p="http://schemas.openxmlformats.org/presentationml/2006/main" xmlns:r="http://schemas.openxmlformats.org/officeDocument/2006/relationships">
+<p:sld xmlns:a="http://schemas.openxmlformats.org/drawingml/2006/main" xmlns:r="http://schemas.openxmlformats.org/officeDocument/2006/relationships" xmlns:p="http://schemas.openxmlformats.org/presentationml/2006/main">
   <p:cSld>
     <p:spTree>
       <p:nvGrpSpPr>
@@ -14174,7 +13769,14 @@
         <p:cNvGrpSpPr/>
         <p:nvPr/>
       </p:nvGrpSpPr>
-      <p:grpSpPr/>
+      <p:grpSpPr>
+        <a:xfrm>
+          <a:off x="0" y="0"/>
+          <a:ext cx="0" cy="0"/>
+          <a:chOff x="0" y="0"/>
+          <a:chExt cx="0" cy="0"/>
+        </a:xfrm>
+      </p:grpSpPr>
       <p:sp>
         <p:nvSpPr>
           <p:cNvPr id="2" name="TextBox 1"/>
@@ -14400,7 +14002,7 @@
         <p:spPr>
           <a:xfrm>
             <a:off x="457200" y="640080"/>
-            <a:ext cx="7315200" cy="731520"/>
+            <a:ext cx="7315200" cy="707886"/>
           </a:xfrm>
           <a:prstGeom prst="rect">
             <a:avLst/>
@@ -14422,6 +14024,7 @@
               </a:defRPr>
             </a:pPr>
             <a:r>
+              <a:rPr sz="4000" dirty="0"/>
               <a:t>Period Highlights</a:t>
             </a:r>
           </a:p>
@@ -14469,6 +14072,7 @@
           <a:lstStyle/>
           <a:p>
             <a:pPr algn="ctr"/>
+            <a:endParaRPr/>
           </a:p>
         </p:txBody>
       </p:sp>
@@ -14586,6 +14190,7 @@
           <a:lstStyle/>
           <a:p>
             <a:pPr algn="ctr"/>
+            <a:endParaRPr/>
           </a:p>
         </p:txBody>
       </p:sp>
@@ -14703,6 +14308,7 @@
           <a:lstStyle/>
           <a:p>
             <a:pPr algn="ctr"/>
+            <a:endParaRPr/>
           </a:p>
         </p:txBody>
       </p:sp>
@@ -14820,6 +14426,7 @@
           <a:lstStyle/>
           <a:p>
             <a:pPr algn="ctr"/>
+            <a:endParaRPr/>
           </a:p>
         </p:txBody>
       </p:sp>
@@ -14904,7 +14511,7 @@
 </file>
 
 <file path=ppt/slides/slide4.xml><?xml version="1.0" encoding="utf-8"?>
-<p:sld xmlns:a="http://schemas.openxmlformats.org/drawingml/2006/main" xmlns:p="http://schemas.openxmlformats.org/presentationml/2006/main" xmlns:r="http://schemas.openxmlformats.org/officeDocument/2006/relationships">
+<p:sld xmlns:a="http://schemas.openxmlformats.org/drawingml/2006/main" xmlns:r="http://schemas.openxmlformats.org/officeDocument/2006/relationships" xmlns:p="http://schemas.openxmlformats.org/presentationml/2006/main">
   <p:cSld>
     <p:spTree>
       <p:nvGrpSpPr>
@@ -14912,7 +14519,14 @@
         <p:cNvGrpSpPr/>
         <p:nvPr/>
       </p:nvGrpSpPr>
-      <p:grpSpPr/>
+      <p:grpSpPr>
+        <a:xfrm>
+          <a:off x="0" y="0"/>
+          <a:ext cx="0" cy="0"/>
+          <a:chOff x="0" y="0"/>
+          <a:chExt cx="0" cy="0"/>
+        </a:xfrm>
+      </p:grpSpPr>
       <p:sp>
         <p:nvSpPr>
           <p:cNvPr id="2" name="TextBox 1"/>
@@ -15138,7 +14752,7 @@
         <p:spPr>
           <a:xfrm>
             <a:off x="457200" y="640080"/>
-            <a:ext cx="7315200" cy="640080"/>
+            <a:ext cx="7792948" cy="707886"/>
           </a:xfrm>
           <a:prstGeom prst="rect">
             <a:avLst/>
@@ -15160,6 +14774,7 @@
               </a:defRPr>
             </a:pPr>
             <a:r>
+              <a:rPr sz="4000" dirty="0"/>
               <a:t>Modeled Cost Exposure Avoided</a:t>
             </a:r>
           </a:p>
@@ -15173,8 +14788,8 @@
         </p:nvSpPr>
         <p:spPr>
           <a:xfrm>
-            <a:off x="457200" y="1371600"/>
-            <a:ext cx="8229600" cy="1645920"/>
+            <a:off x="457200" y="1768137"/>
+            <a:ext cx="8229600" cy="646331"/>
           </a:xfrm>
           <a:prstGeom prst="rect">
             <a:avLst/>
@@ -15196,6 +14811,7 @@
               </a:defRPr>
             </a:pPr>
             <a:r>
+              <a:rPr sz="3600" dirty="0"/>
               <a:t>~$7.55M</a:t>
             </a:r>
           </a:p>
@@ -15232,6 +14848,7 @@
               </a:defRPr>
             </a:pPr>
             <a:r>
+              <a:rPr dirty="0"/>
               <a:t>Modeled cost exposure avoided across operations, coverage, and threat containment</a:t>
             </a:r>
           </a:p>
@@ -15246,7 +14863,7 @@
         <p:spPr>
           <a:xfrm>
             <a:off x="457200" y="4366260"/>
-            <a:ext cx="8229600" cy="365760"/>
+            <a:ext cx="8229600" cy="307777"/>
           </a:xfrm>
           <a:prstGeom prst="rect">
             <a:avLst/>
@@ -15268,7 +14885,16 @@
               </a:defRPr>
             </a:pPr>
             <a:r>
-              <a:t>Illustrative impact only; not redeployable budget</a:t>
+              <a:rPr dirty="0"/>
+              <a:t>Illustrative impact only; not </a:t>
+            </a:r>
+            <a:r>
+              <a:rPr dirty="0" err="1"/>
+              <a:t>redeployable</a:t>
+            </a:r>
+            <a:r>
+              <a:rPr dirty="0"/>
+              <a:t> budget</a:t>
             </a:r>
           </a:p>
         </p:txBody>
@@ -15282,7 +14908,7 @@
 </file>
 
 <file path=ppt/slides/slide5.xml><?xml version="1.0" encoding="utf-8"?>
-<p:sld xmlns:a="http://schemas.openxmlformats.org/drawingml/2006/main" xmlns:p="http://schemas.openxmlformats.org/presentationml/2006/main" xmlns:r="http://schemas.openxmlformats.org/officeDocument/2006/relationships">
+<p:sld xmlns:a="http://schemas.openxmlformats.org/drawingml/2006/main" xmlns:r="http://schemas.openxmlformats.org/officeDocument/2006/relationships" xmlns:p="http://schemas.openxmlformats.org/presentationml/2006/main">
   <p:cSld>
     <p:spTree>
       <p:nvGrpSpPr>
@@ -15290,7 +14916,14 @@
         <p:cNvGrpSpPr/>
         <p:nvPr/>
       </p:nvGrpSpPr>
-      <p:grpSpPr/>
+      <p:grpSpPr>
+        <a:xfrm>
+          <a:off x="0" y="0"/>
+          <a:ext cx="0" cy="0"/>
+          <a:chOff x="0" y="0"/>
+          <a:chExt cx="0" cy="0"/>
+        </a:xfrm>
+      </p:grpSpPr>
       <p:sp>
         <p:nvSpPr>
           <p:cNvPr id="2" name="TextBox 1"/>
@@ -15516,7 +15149,7 @@
         <p:spPr>
           <a:xfrm>
             <a:off x="457200" y="640080"/>
-            <a:ext cx="7315200" cy="640080"/>
+            <a:ext cx="7315200" cy="646331"/>
           </a:xfrm>
           <a:prstGeom prst="rect">
             <a:avLst/>
@@ -15538,6 +15171,7 @@
               </a:defRPr>
             </a:pPr>
             <a:r>
+              <a:rPr sz="3600" dirty="0"/>
               <a:t>Value Delivered - Breakdown</a:t>
             </a:r>
           </a:p>
@@ -15585,6 +15219,7 @@
           <a:lstStyle/>
           <a:p>
             <a:pPr algn="ctr"/>
+            <a:endParaRPr/>
           </a:p>
         </p:txBody>
       </p:sp>
@@ -15619,6 +15254,7 @@
               </a:defRPr>
             </a:pPr>
             <a:r>
+              <a:rPr dirty="0"/>
               <a:t>Security Operations</a:t>
             </a:r>
           </a:p>
@@ -15655,6 +15291,7 @@
               </a:defRPr>
             </a:pPr>
             <a:r>
+              <a:rPr dirty="0"/>
               <a:t>452 analyst hours delivered</a:t>
             </a:r>
           </a:p>
@@ -15669,7 +15306,7 @@
         <p:spPr>
           <a:xfrm>
             <a:off x="640080" y="3200400"/>
-            <a:ext cx="2011680" cy="548640"/>
+            <a:ext cx="2011680" cy="707886"/>
           </a:xfrm>
           <a:prstGeom prst="rect">
             <a:avLst/>
@@ -15691,6 +15328,7 @@
               </a:defRPr>
             </a:pPr>
             <a:r>
+              <a:rPr sz="2000" dirty="0"/>
               <a:t>~$38K equivalent</a:t>
             </a:r>
           </a:p>
@@ -15738,6 +15376,7 @@
           <a:lstStyle/>
           <a:p>
             <a:pPr algn="ctr"/>
+            <a:endParaRPr/>
           </a:p>
         </p:txBody>
       </p:sp>
@@ -15822,7 +15461,7 @@
         <p:spPr>
           <a:xfrm>
             <a:off x="3200400" y="3200400"/>
-            <a:ext cx="2011680" cy="548640"/>
+            <a:ext cx="2011680" cy="707886"/>
           </a:xfrm>
           <a:prstGeom prst="rect">
             <a:avLst/>
@@ -15844,6 +15483,7 @@
               </a:defRPr>
             </a:pPr>
             <a:r>
+              <a:rPr sz="2000" dirty="0"/>
               <a:t>~$163K equivalent</a:t>
             </a:r>
           </a:p>
@@ -15891,6 +15531,7 @@
           <a:lstStyle/>
           <a:p>
             <a:pPr algn="ctr"/>
+            <a:endParaRPr/>
           </a:p>
         </p:txBody>
       </p:sp>
@@ -15974,8 +15615,8 @@
         </p:nvSpPr>
         <p:spPr>
           <a:xfrm>
-            <a:off x="5760720" y="3200400"/>
-            <a:ext cx="2011680" cy="548640"/>
+            <a:off x="5760720" y="3138844"/>
+            <a:ext cx="2011680" cy="830997"/>
           </a:xfrm>
           <a:prstGeom prst="rect">
             <a:avLst/>
@@ -15997,7 +15638,23 @@
               </a:defRPr>
             </a:pPr>
             <a:r>
-              <a:t>~$7.34M breach exposure avoided</a:t>
+              <a:rPr sz="2000" dirty="0"/>
+              <a:t>~$7.34M </a:t>
+            </a:r>
+            <a:endParaRPr lang="en-US" sz="2000" dirty="0"/>
+          </a:p>
+          <a:p>
+            <a:pPr algn="ctr">
+              <a:defRPr sz="2400" b="1">
+                <a:solidFill>
+                  <a:srgbClr val="004C97"/>
+                </a:solidFill>
+                <a:latin typeface="Roboto"/>
+              </a:defRPr>
+            </a:pPr>
+            <a:r>
+              <a:rPr sz="1400" dirty="0"/>
+              <a:t>breach exposure avoided</a:t>
             </a:r>
           </a:p>
         </p:txBody>
@@ -16047,7 +15704,7 @@
 </file>
 
 <file path=ppt/slides/slide6.xml><?xml version="1.0" encoding="utf-8"?>
-<p:sld xmlns:a="http://schemas.openxmlformats.org/drawingml/2006/main" xmlns:p="http://schemas.openxmlformats.org/presentationml/2006/main" xmlns:r="http://schemas.openxmlformats.org/officeDocument/2006/relationships">
+<p:sld xmlns:a="http://schemas.openxmlformats.org/drawingml/2006/main" xmlns:r="http://schemas.openxmlformats.org/officeDocument/2006/relationships" xmlns:p="http://schemas.openxmlformats.org/presentationml/2006/main">
   <p:cSld>
     <p:spTree>
       <p:nvGrpSpPr>
@@ -16055,7 +15712,14 @@
         <p:cNvGrpSpPr/>
         <p:nvPr/>
       </p:nvGrpSpPr>
-      <p:grpSpPr/>
+      <p:grpSpPr>
+        <a:xfrm>
+          <a:off x="0" y="0"/>
+          <a:ext cx="0" cy="0"/>
+          <a:chOff x="0" y="0"/>
+          <a:chExt cx="0" cy="0"/>
+        </a:xfrm>
+      </p:grpSpPr>
       <p:sp>
         <p:nvSpPr>
           <p:cNvPr id="2" name="TextBox 1"/>
@@ -16281,7 +15945,7 @@
         <p:spPr>
           <a:xfrm>
             <a:off x="457200" y="640080"/>
-            <a:ext cx="7315200" cy="640080"/>
+            <a:ext cx="7315200" cy="646331"/>
           </a:xfrm>
           <a:prstGeom prst="rect">
             <a:avLst/>
@@ -16303,6 +15967,7 @@
               </a:defRPr>
             </a:pPr>
             <a:r>
+              <a:rPr sz="3600" dirty="0"/>
               <a:t>Security Outcomes This Period</a:t>
             </a:r>
           </a:p>
@@ -16317,15 +15982,15 @@
         <p:spPr>
           <a:xfrm>
             <a:off x="731520" y="1371600"/>
-            <a:ext cx="7680960" cy="3177540"/>
-          </a:xfrm>
-          <a:prstGeom prst="rect">
-            <a:avLst/>
-          </a:prstGeom>
-          <a:noFill/>
-        </p:spPr>
-        <p:txBody>
-          <a:bodyPr wrap="square" lIns="274320" rIns="274320" tIns="182880" bIns="182880">
+            <a:ext cx="7680960" cy="3477875"/>
+          </a:xfrm>
+          <a:prstGeom prst="rect">
+            <a:avLst/>
+          </a:prstGeom>
+          <a:noFill/>
+        </p:spPr>
+        <p:txBody>
+          <a:bodyPr wrap="square" lIns="274320" tIns="182880" rIns="274320" bIns="182880">
             <a:spAutoFit/>
           </a:bodyPr>
           <a:lstStyle/>
@@ -16342,6 +16007,7 @@
               </a:defRPr>
             </a:pPr>
             <a:r>
+              <a:rPr sz="1600" dirty="0"/>
               <a:t>• 2,110 Alerts Triaged</a:t>
             </a:r>
           </a:p>
@@ -16358,6 +16024,7 @@
               </a:defRPr>
             </a:pPr>
             <a:r>
+              <a:rPr sz="1600" dirty="0"/>
               <a:t>• 1,690 Client-Touch Decisions</a:t>
             </a:r>
           </a:p>
@@ -16374,6 +16041,7 @@
               </a:defRPr>
             </a:pPr>
             <a:r>
+              <a:rPr sz="1600" dirty="0"/>
               <a:t>• 420 Closed End-to-End</a:t>
             </a:r>
           </a:p>
@@ -16390,6 +16058,7 @@
               </a:defRPr>
             </a:pPr>
             <a:r>
+              <a:rPr sz="1600" dirty="0"/>
               <a:t>• 11 True Threats Contained</a:t>
             </a:r>
           </a:p>
@@ -16406,6 +16075,7 @@
               </a:defRPr>
             </a:pPr>
             <a:r>
+              <a:rPr sz="1600" dirty="0"/>
               <a:t>• 34% Faster Than Industry</a:t>
             </a:r>
           </a:p>
@@ -16422,6 +16092,7 @@
               </a:defRPr>
             </a:pPr>
             <a:r>
+              <a:rPr sz="1600" dirty="0"/>
               <a:t>• 87-Minute P90 Response</a:t>
             </a:r>
           </a:p>
@@ -16438,6 +16109,7 @@
               </a:defRPr>
             </a:pPr>
             <a:r>
+              <a:rPr sz="1600" dirty="0"/>
               <a:t>• 158 After-Hours Escalations</a:t>
             </a:r>
           </a:p>
@@ -16454,6 +16126,7 @@
               </a:defRPr>
             </a:pPr>
             <a:r>
+              <a:rPr sz="1600" dirty="0"/>
               <a:t>• 744 Hours of Coverage</a:t>
             </a:r>
           </a:p>
@@ -16468,7 +16141,7 @@
 </file>
 
 <file path=ppt/slides/slide7.xml><?xml version="1.0" encoding="utf-8"?>
-<p:sld xmlns:a="http://schemas.openxmlformats.org/drawingml/2006/main" xmlns:p="http://schemas.openxmlformats.org/presentationml/2006/main" xmlns:r="http://schemas.openxmlformats.org/officeDocument/2006/relationships">
+<p:sld xmlns:a="http://schemas.openxmlformats.org/drawingml/2006/main" xmlns:r="http://schemas.openxmlformats.org/officeDocument/2006/relationships" xmlns:p="http://schemas.openxmlformats.org/presentationml/2006/main">
   <p:cSld>
     <p:spTree>
       <p:nvGrpSpPr>
@@ -16476,7 +16149,14 @@
         <p:cNvGrpSpPr/>
         <p:nvPr/>
       </p:nvGrpSpPr>
-      <p:grpSpPr/>
+      <p:grpSpPr>
+        <a:xfrm>
+          <a:off x="0" y="0"/>
+          <a:ext cx="0" cy="0"/>
+          <a:chOff x="0" y="0"/>
+          <a:chExt cx="0" cy="0"/>
+        </a:xfrm>
+      </p:grpSpPr>
       <p:sp>
         <p:nvSpPr>
           <p:cNvPr id="2" name="TextBox 1"/>
@@ -16702,7 +16382,7 @@
         <p:spPr>
           <a:xfrm>
             <a:off x="457200" y="640080"/>
-            <a:ext cx="7315200" cy="640080"/>
+            <a:ext cx="7315200" cy="707886"/>
           </a:xfrm>
           <a:prstGeom prst="rect">
             <a:avLst/>
@@ -16724,6 +16404,7 @@
               </a:defRPr>
             </a:pPr>
             <a:r>
+              <a:rPr sz="4000" dirty="0"/>
               <a:t>Getting Better Every Period</a:t>
             </a:r>
           </a:p>
@@ -16773,8 +16454,8 @@
         </p:nvSpPr>
         <p:spPr>
           <a:xfrm>
-            <a:off x="731520" y="4572000"/>
-            <a:ext cx="7680960" cy="731520"/>
+            <a:off x="731520" y="4343400"/>
+            <a:ext cx="7680960" cy="320040"/>
           </a:xfrm>
           <a:prstGeom prst="rect">
             <a:avLst/>
@@ -16815,6 +16496,7 @@
               </a:defRPr>
             </a:pPr>
             <a:r>
+              <a:rPr dirty="0"/>
               <a:t>MTTR decreased 25% to 126 minutes, MTTD improved 22% to 42 minutes</a:t>
             </a:r>
           </a:p>
@@ -16853,7 +16535,7 @@
 </file>
 
 <file path=ppt/slides/slide8.xml><?xml version="1.0" encoding="utf-8"?>
-<p:sld xmlns:a="http://schemas.openxmlformats.org/drawingml/2006/main" xmlns:p="http://schemas.openxmlformats.org/presentationml/2006/main" xmlns:r="http://schemas.openxmlformats.org/officeDocument/2006/relationships">
+<p:sld xmlns:a="http://schemas.openxmlformats.org/drawingml/2006/main" xmlns:r="http://schemas.openxmlformats.org/officeDocument/2006/relationships" xmlns:p="http://schemas.openxmlformats.org/presentationml/2006/main">
   <p:cSld>
     <p:spTree>
       <p:nvGrpSpPr>
@@ -16861,7 +16543,14 @@
         <p:cNvGrpSpPr/>
         <p:nvPr/>
       </p:nvGrpSpPr>
-      <p:grpSpPr/>
+      <p:grpSpPr>
+        <a:xfrm>
+          <a:off x="0" y="0"/>
+          <a:ext cx="0" cy="0"/>
+          <a:chOff x="0" y="0"/>
+          <a:chExt cx="0" cy="0"/>
+        </a:xfrm>
+      </p:grpSpPr>
       <p:sp>
         <p:nvSpPr>
           <p:cNvPr id="2" name="TextBox 1"/>
@@ -17087,7 +16776,7 @@
         <p:spPr>
           <a:xfrm>
             <a:off x="457200" y="640080"/>
-            <a:ext cx="7315200" cy="640080"/>
+            <a:ext cx="7315200" cy="707886"/>
           </a:xfrm>
           <a:prstGeom prst="rect">
             <a:avLst/>
@@ -17109,6 +16798,7 @@
               </a:defRPr>
             </a:pPr>
             <a:r>
+              <a:rPr sz="4000" dirty="0"/>
               <a:t>Industry Comparison</a:t>
             </a:r>
           </a:p>
@@ -17154,6 +16844,7 @@
           <a:lstStyle/>
           <a:p>
             <a:pPr algn="ctr"/>
+            <a:endParaRPr/>
           </a:p>
         </p:txBody>
       </p:sp>
@@ -17298,49 +16989,6 @@
             <a:r>
               <a:t>Difference</a:t>
             </a:r>
-          </a:p>
-        </p:txBody>
-      </p:sp>
-      <p:sp>
-        <p:nvSpPr>
-          <p:cNvPr id="14" name="Rectangle 13"/>
-          <p:cNvSpPr/>
-          <p:nvPr/>
-        </p:nvSpPr>
-        <p:spPr>
-          <a:xfrm>
-            <a:off x="914400" y="2034540"/>
-            <a:ext cx="7315200" cy="571500"/>
-          </a:xfrm>
-          <a:prstGeom prst="rect">
-            <a:avLst/>
-          </a:prstGeom>
-          <a:solidFill>
-            <a:srgbClr val="FAFAFA"/>
-          </a:solidFill>
-          <a:ln>
-            <a:noFill/>
-          </a:ln>
-        </p:spPr>
-        <p:style>
-          <a:lnRef idx="1">
-            <a:schemeClr val="accent1"/>
-          </a:lnRef>
-          <a:fillRef idx="3">
-            <a:schemeClr val="accent1"/>
-          </a:fillRef>
-          <a:effectRef idx="2">
-            <a:schemeClr val="accent1"/>
-          </a:effectRef>
-          <a:fontRef idx="minor">
-            <a:schemeClr val="lt1"/>
-          </a:fontRef>
-        </p:style>
-        <p:txBody>
-          <a:bodyPr rtlCol="0" anchor="ctr"/>
-          <a:lstStyle/>
-          <a:p>
-            <a:pPr algn="ctr"/>
           </a:p>
         </p:txBody>
       </p:sp>
@@ -17492,6 +17140,7 @@
           <a:lstStyle/>
           <a:p>
             <a:pPr algn="ctr"/>
+            <a:endParaRPr/>
           </a:p>
         </p:txBody>
       </p:sp>
@@ -17679,6 +17328,7 @@
           <a:lstStyle/>
           <a:p>
             <a:pPr algn="ctr"/>
+            <a:endParaRPr/>
           </a:p>
         </p:txBody>
       </p:sp>
@@ -17715,49 +17365,6 @@
             <a:r>
               <a:t>36% Better</a:t>
             </a:r>
-          </a:p>
-        </p:txBody>
-      </p:sp>
-      <p:sp>
-        <p:nvSpPr>
-          <p:cNvPr id="25" name="Rectangle 24"/>
-          <p:cNvSpPr/>
-          <p:nvPr/>
-        </p:nvSpPr>
-        <p:spPr>
-          <a:xfrm>
-            <a:off x="914400" y="3177540"/>
-            <a:ext cx="7315200" cy="571500"/>
-          </a:xfrm>
-          <a:prstGeom prst="rect">
-            <a:avLst/>
-          </a:prstGeom>
-          <a:solidFill>
-            <a:srgbClr val="FAFAFA"/>
-          </a:solidFill>
-          <a:ln>
-            <a:noFill/>
-          </a:ln>
-        </p:spPr>
-        <p:style>
-          <a:lnRef idx="1">
-            <a:schemeClr val="accent1"/>
-          </a:lnRef>
-          <a:fillRef idx="3">
-            <a:schemeClr val="accent1"/>
-          </a:fillRef>
-          <a:effectRef idx="2">
-            <a:schemeClr val="accent1"/>
-          </a:effectRef>
-          <a:fontRef idx="minor">
-            <a:schemeClr val="lt1"/>
-          </a:fontRef>
-        </p:style>
-        <p:txBody>
-          <a:bodyPr rtlCol="0" anchor="ctr"/>
-          <a:lstStyle/>
-          <a:p>
-            <a:pPr algn="ctr"/>
           </a:p>
         </p:txBody>
       </p:sp>
@@ -17909,6 +17516,7 @@
           <a:lstStyle/>
           <a:p>
             <a:pPr algn="ctr"/>
+            <a:endParaRPr/>
           </a:p>
         </p:txBody>
       </p:sp>
@@ -17957,7 +17565,7 @@
 </file>
 
 <file path=ppt/slides/slide9.xml><?xml version="1.0" encoding="utf-8"?>
-<p:sld xmlns:a="http://schemas.openxmlformats.org/drawingml/2006/main" xmlns:p="http://schemas.openxmlformats.org/presentationml/2006/main" xmlns:r="http://schemas.openxmlformats.org/officeDocument/2006/relationships">
+<p:sld xmlns:a="http://schemas.openxmlformats.org/drawingml/2006/main" xmlns:r="http://schemas.openxmlformats.org/officeDocument/2006/relationships" xmlns:p="http://schemas.openxmlformats.org/presentationml/2006/main">
   <p:cSld>
     <p:spTree>
       <p:nvGrpSpPr>
@@ -17965,7 +17573,14 @@
         <p:cNvGrpSpPr/>
         <p:nvPr/>
       </p:nvGrpSpPr>
-      <p:grpSpPr/>
+      <p:grpSpPr>
+        <a:xfrm>
+          <a:off x="0" y="0"/>
+          <a:ext cx="0" cy="0"/>
+          <a:chOff x="0" y="0"/>
+          <a:chExt cx="0" cy="0"/>
+        </a:xfrm>
+      </p:grpSpPr>
       <p:sp>
         <p:nvSpPr>
           <p:cNvPr id="2" name="TextBox 1"/>
@@ -18191,7 +17806,7 @@
         <p:spPr>
           <a:xfrm>
             <a:off x="457200" y="640080"/>
-            <a:ext cx="7315200" cy="640080"/>
+            <a:ext cx="7315200" cy="707886"/>
           </a:xfrm>
           <a:prstGeom prst="rect">
             <a:avLst/>
@@ -18213,6 +17828,7 @@
               </a:defRPr>
             </a:pPr>
             <a:r>
+              <a:rPr sz="4000" dirty="0"/>
               <a:t>Response Efficiency</a:t>
             </a:r>
           </a:p>
@@ -18260,6 +17876,7 @@
           <a:lstStyle/>
           <a:p>
             <a:pPr algn="ctr"/>
+            <a:endParaRPr/>
           </a:p>
         </p:txBody>
       </p:sp>
@@ -18413,6 +18030,7 @@
           <a:lstStyle/>
           <a:p>
             <a:pPr algn="ctr"/>
+            <a:endParaRPr/>
           </a:p>
         </p:txBody>
       </p:sp>
@@ -18566,6 +18184,7 @@
           <a:lstStyle/>
           <a:p>
             <a:pPr algn="ctr"/>
+            <a:endParaRPr/>
           </a:p>
         </p:txBody>
       </p:sp>

</xml_diff>